<commit_message>
Add exposure normalization, sensitivity analysis, and improved recommendations,also updated my presentation to executive summary and created a file to store dependencies for reproducibility
</commit_message>
<xml_diff>
--- a/Presentation/Low Risk Aircraft Selection Using Historical Aviation Accident Data.pptx
+++ b/Presentation/Low Risk Aircraft Selection Using Historical Aviation Accident Data.pptx
@@ -8,18 +8,13 @@
     <p:sldId id="256" r:id="rId2"/>
     <p:sldId id="258" r:id="rId3"/>
     <p:sldId id="257" r:id="rId4"/>
-    <p:sldId id="259" r:id="rId5"/>
-    <p:sldId id="260" r:id="rId6"/>
-    <p:sldId id="261" r:id="rId7"/>
-    <p:sldId id="262" r:id="rId8"/>
-    <p:sldId id="263" r:id="rId9"/>
-    <p:sldId id="264" r:id="rId10"/>
-    <p:sldId id="265" r:id="rId11"/>
-    <p:sldId id="266" r:id="rId12"/>
-    <p:sldId id="267" r:id="rId13"/>
-    <p:sldId id="268" r:id="rId14"/>
-    <p:sldId id="269" r:id="rId15"/>
-    <p:sldId id="270" r:id="rId16"/>
+    <p:sldId id="261" r:id="rId5"/>
+    <p:sldId id="262" r:id="rId6"/>
+    <p:sldId id="263" r:id="rId7"/>
+    <p:sldId id="264" r:id="rId8"/>
+    <p:sldId id="271" r:id="rId9"/>
+    <p:sldId id="265" r:id="rId10"/>
+    <p:sldId id="266" r:id="rId11"/>
   </p:sldIdLst>
   <p:sldSz cx="12192000" cy="6858000"/>
   <p:notesSz cx="6858000" cy="9144000"/>
@@ -126,12 +121,10 @@
             <p14:sldId id="256"/>
             <p14:sldId id="258"/>
             <p14:sldId id="257"/>
-            <p14:sldId id="259"/>
           </p14:sldIdLst>
         </p14:section>
         <p14:section name="Data Manipulation,Cleaning,EDA @ Reporting" id="{2CF09281-575C-4316-BC3E-AEB64C18ABDF}">
           <p14:sldIdLst>
-            <p14:sldId id="260"/>
             <p14:sldId id="261"/>
             <p14:sldId id="262"/>
             <p14:sldId id="263"/>
@@ -140,16 +133,9 @@
         </p14:section>
         <p14:section name="Reccomendation and Summary" id="{5CE6F034-4E8B-493F-8AD7-9E873603CC21}">
           <p14:sldIdLst>
+            <p14:sldId id="271"/>
             <p14:sldId id="265"/>
             <p14:sldId id="266"/>
-            <p14:sldId id="267"/>
-            <p14:sldId id="268"/>
-            <p14:sldId id="269"/>
-          </p14:sldIdLst>
-        </p14:section>
-        <p14:section name="Results" id="{901FFA06-33CF-4DE5-A278-0CE7C41CE424}">
-          <p14:sldIdLst>
-            <p14:sldId id="270"/>
           </p14:sldIdLst>
         </p14:section>
       </p14:sectionLst>
@@ -319,7 +305,7 @@
           <a:p>
             <a:fld id="{E3D37702-00D3-48E8-96C0-DBDDB3B8B4E9}" type="datetimeFigureOut">
               <a:rPr lang="en-US" smtClean="0"/>
-              <a:t>12/15/2025</a:t>
+              <a:t>12/18/2025</a:t>
             </a:fld>
             <a:endParaRPr lang="en-US"/>
           </a:p>
@@ -517,7 +503,7 @@
           <a:p>
             <a:fld id="{E3D37702-00D3-48E8-96C0-DBDDB3B8B4E9}" type="datetimeFigureOut">
               <a:rPr lang="en-US" smtClean="0"/>
-              <a:t>12/15/2025</a:t>
+              <a:t>12/18/2025</a:t>
             </a:fld>
             <a:endParaRPr lang="en-US"/>
           </a:p>
@@ -725,7 +711,7 @@
           <a:p>
             <a:fld id="{E3D37702-00D3-48E8-96C0-DBDDB3B8B4E9}" type="datetimeFigureOut">
               <a:rPr lang="en-US" smtClean="0"/>
-              <a:t>12/15/2025</a:t>
+              <a:t>12/18/2025</a:t>
             </a:fld>
             <a:endParaRPr lang="en-US"/>
           </a:p>
@@ -923,7 +909,7 @@
           <a:p>
             <a:fld id="{E3D37702-00D3-48E8-96C0-DBDDB3B8B4E9}" type="datetimeFigureOut">
               <a:rPr lang="en-US" smtClean="0"/>
-              <a:t>12/15/2025</a:t>
+              <a:t>12/18/2025</a:t>
             </a:fld>
             <a:endParaRPr lang="en-US"/>
           </a:p>
@@ -1198,7 +1184,7 @@
           <a:p>
             <a:fld id="{E3D37702-00D3-48E8-96C0-DBDDB3B8B4E9}" type="datetimeFigureOut">
               <a:rPr lang="en-US" smtClean="0"/>
-              <a:t>12/15/2025</a:t>
+              <a:t>12/18/2025</a:t>
             </a:fld>
             <a:endParaRPr lang="en-US"/>
           </a:p>
@@ -1463,7 +1449,7 @@
           <a:p>
             <a:fld id="{E3D37702-00D3-48E8-96C0-DBDDB3B8B4E9}" type="datetimeFigureOut">
               <a:rPr lang="en-US" smtClean="0"/>
-              <a:t>12/15/2025</a:t>
+              <a:t>12/18/2025</a:t>
             </a:fld>
             <a:endParaRPr lang="en-US"/>
           </a:p>
@@ -1875,7 +1861,7 @@
           <a:p>
             <a:fld id="{E3D37702-00D3-48E8-96C0-DBDDB3B8B4E9}" type="datetimeFigureOut">
               <a:rPr lang="en-US" smtClean="0"/>
-              <a:t>12/15/2025</a:t>
+              <a:t>12/18/2025</a:t>
             </a:fld>
             <a:endParaRPr lang="en-US"/>
           </a:p>
@@ -2016,7 +2002,7 @@
           <a:p>
             <a:fld id="{E3D37702-00D3-48E8-96C0-DBDDB3B8B4E9}" type="datetimeFigureOut">
               <a:rPr lang="en-US" smtClean="0"/>
-              <a:t>12/15/2025</a:t>
+              <a:t>12/18/2025</a:t>
             </a:fld>
             <a:endParaRPr lang="en-US"/>
           </a:p>
@@ -2129,7 +2115,7 @@
           <a:p>
             <a:fld id="{E3D37702-00D3-48E8-96C0-DBDDB3B8B4E9}" type="datetimeFigureOut">
               <a:rPr lang="en-US" smtClean="0"/>
-              <a:t>12/15/2025</a:t>
+              <a:t>12/18/2025</a:t>
             </a:fld>
             <a:endParaRPr lang="en-US"/>
           </a:p>
@@ -2440,7 +2426,7 @@
           <a:p>
             <a:fld id="{E3D37702-00D3-48E8-96C0-DBDDB3B8B4E9}" type="datetimeFigureOut">
               <a:rPr lang="en-US" smtClean="0"/>
-              <a:t>12/15/2025</a:t>
+              <a:t>12/18/2025</a:t>
             </a:fld>
             <a:endParaRPr lang="en-US"/>
           </a:p>
@@ -2728,7 +2714,7 @@
           <a:p>
             <a:fld id="{E3D37702-00D3-48E8-96C0-DBDDB3B8B4E9}" type="datetimeFigureOut">
               <a:rPr lang="en-US" smtClean="0"/>
-              <a:t>12/15/2025</a:t>
+              <a:t>12/18/2025</a:t>
             </a:fld>
             <a:endParaRPr lang="en-US"/>
           </a:p>
@@ -2972,7 +2958,7 @@
           <a:p>
             <a:fld id="{E3D37702-00D3-48E8-96C0-DBDDB3B8B4E9}" type="datetimeFigureOut">
               <a:rPr lang="en-US" smtClean="0"/>
-              <a:t>12/15/2025</a:t>
+              <a:t>12/18/2025</a:t>
             </a:fld>
             <a:endParaRPr lang="en-US"/>
           </a:p>
@@ -3479,7 +3465,7 @@
                 </a:solidFill>
                 <a:latin typeface="Copperplate Gothic Bold" panose="020E0705020206020404" pitchFamily="34" charset="0"/>
               </a:rPr>
-              <a:t>Low Risk Aircraft Selection Using Historical Aviation Accident Data</a:t>
+              <a:t>Stakeholder’s Summary</a:t>
             </a:r>
             <a:br>
               <a:rPr lang="en-US" sz="4800" dirty="0">
@@ -3532,104 +3518,54 @@
           <a:bodyPr/>
           <a:lstStyle/>
           <a:p>
-            <a:r>
-              <a:rPr lang="en-US" dirty="0">
-                <a:solidFill>
-                  <a:schemeClr val="bg1"/>
-                </a:solidFill>
-                <a:latin typeface="Arial Black" panose="020B0A04020102020204" pitchFamily="34" charset="0"/>
-              </a:rPr>
-              <a:t>A Data Driven Risk Assessment for Purchase of Aircrafts for Commercial &amp; Private Operations</a:t>
-            </a:r>
-          </a:p>
-          <a:p>
-            <a:r>
-              <a:rPr lang="en-US" dirty="0">
-                <a:solidFill>
-                  <a:schemeClr val="bg1"/>
-                </a:solidFill>
-                <a:latin typeface="Arial Black" panose="020B0A04020102020204" pitchFamily="34" charset="0"/>
-              </a:rPr>
-              <a:t>Aviation Safety and Risk Analysis</a:t>
-            </a:r>
-          </a:p>
-          <a:p>
-            <a:r>
-              <a:rPr lang="en-US" dirty="0">
-                <a:solidFill>
-                  <a:schemeClr val="bg1"/>
-                </a:solidFill>
-                <a:latin typeface="Arial Black" panose="020B0A04020102020204" pitchFamily="34" charset="0"/>
-              </a:rPr>
-              <a:t>2025</a:t>
-            </a:r>
-          </a:p>
-          <a:p>
-            <a:pPr algn="l"/>
-            <a:r>
-              <a:rPr lang="en-US" dirty="0">
-                <a:solidFill>
-                  <a:schemeClr val="bg1"/>
-                </a:solidFill>
-                <a:latin typeface="Berlin Sans FB Demi" panose="020E0802020502020306" pitchFamily="34" charset="0"/>
-              </a:rPr>
-              <a:t>This analysis is based on aviation accident records spanning </a:t>
-            </a:r>
-            <a:r>
-              <a:rPr lang="en-US" b="1" dirty="0">
-                <a:solidFill>
-                  <a:schemeClr val="bg1"/>
-                </a:solidFill>
-                <a:latin typeface="Berlin Sans FB Demi" panose="020E0802020502020306" pitchFamily="34" charset="0"/>
-              </a:rPr>
-              <a:t>41 years (1982–2022)</a:t>
-            </a:r>
-            <a:r>
-              <a:rPr lang="en-US" dirty="0">
-                <a:solidFill>
-                  <a:schemeClr val="bg1"/>
-                </a:solidFill>
-                <a:latin typeface="Berlin Sans FB Demi" panose="020E0802020502020306" pitchFamily="34" charset="0"/>
-              </a:rPr>
-              <a:t>, providing a long-term and reliable view of aircraft safety performance across different models.</a:t>
-            </a:r>
-          </a:p>
-          <a:p>
-            <a:r>
-              <a:rPr lang="en-US" dirty="0">
-                <a:solidFill>
-                  <a:schemeClr val="bg1"/>
-                </a:solidFill>
-                <a:latin typeface="Arial Black" panose="020B0A04020102020204" pitchFamily="34" charset="0"/>
-              </a:rPr>
-              <a:t>Prepared by </a:t>
-            </a:r>
-            <a:r>
-              <a:rPr lang="en-US" dirty="0" err="1">
-                <a:solidFill>
-                  <a:schemeClr val="bg1"/>
-                </a:solidFill>
-                <a:latin typeface="Arial Black" panose="020B0A04020102020204" pitchFamily="34" charset="0"/>
-              </a:rPr>
-              <a:t>Brian.M.Chairo</a:t>
-            </a:r>
-            <a:r>
-              <a:rPr lang="en-US" dirty="0">
-                <a:solidFill>
-                  <a:schemeClr val="bg1"/>
-                </a:solidFill>
-                <a:latin typeface="Arial Black" panose="020B0A04020102020204" pitchFamily="34" charset="0"/>
-              </a:rPr>
-              <a:t> | Data Science &amp; Risk Analysis</a:t>
-            </a:r>
-          </a:p>
-          <a:p>
             <a:endParaRPr lang="en-US" dirty="0">
               <a:solidFill>
                 <a:schemeClr val="bg1"/>
               </a:solidFill>
               <a:latin typeface="Arial Black" panose="020B0A04020102020204" pitchFamily="34" charset="0"/>
             </a:endParaRPr>
+          </a:p>
+          <a:p>
+            <a:pPr marL="457200" indent="-457200" algn="l">
+              <a:buFont typeface="Arial" panose="020B0604020202020204" pitchFamily="34" charset="0"/>
+              <a:buChar char="•"/>
+            </a:pPr>
+            <a:r>
+              <a:rPr lang="en-US" sz="2800" dirty="0">
+                <a:solidFill>
+                  <a:schemeClr val="bg1"/>
+                </a:solidFill>
+                <a:latin typeface="Arial Black" panose="020B0A04020102020204" pitchFamily="34" charset="0"/>
+              </a:rPr>
+              <a:t>Objective: Reduce safety and financial risk in aircraft acquisition</a:t>
+            </a:r>
+          </a:p>
+          <a:p>
+            <a:pPr marL="457200" indent="-457200" algn="l">
+              <a:buFont typeface="Arial" panose="020B0604020202020204" pitchFamily="34" charset="0"/>
+              <a:buChar char="•"/>
+            </a:pPr>
+            <a:endParaRPr lang="en-US" sz="2800" dirty="0">
+              <a:solidFill>
+                <a:schemeClr val="bg1"/>
+              </a:solidFill>
+              <a:latin typeface="Arial Black" panose="020B0A04020102020204" pitchFamily="34" charset="0"/>
+            </a:endParaRPr>
+          </a:p>
+          <a:p>
+            <a:pPr marL="457200" indent="-457200" algn="l">
+              <a:buFont typeface="Arial" panose="020B0604020202020204" pitchFamily="34" charset="0"/>
+              <a:buChar char="•"/>
+            </a:pPr>
+            <a:r>
+              <a:rPr lang="en-US" sz="2800" dirty="0">
+                <a:solidFill>
+                  <a:schemeClr val="bg1"/>
+                </a:solidFill>
+                <a:latin typeface="Arial Black" panose="020B0A04020102020204" pitchFamily="34" charset="0"/>
+              </a:rPr>
+              <a:t>Outcome: Evidence based shortlist of lower risk aircraft models.</a:t>
+            </a:r>
           </a:p>
         </p:txBody>
       </p:sp>
@@ -3668,7 +3604,7 @@
           <p:cNvPr id="2" name="Title 1">
             <a:extLst>
               <a:ext uri="{FF2B5EF4-FFF2-40B4-BE49-F238E27FC236}">
-                <a16:creationId xmlns:a16="http://schemas.microsoft.com/office/drawing/2014/main" id="{9FAF2FAE-C1C4-1AEC-6A55-122CAEFCC976}"/>
+                <a16:creationId xmlns:a16="http://schemas.microsoft.com/office/drawing/2014/main" id="{965C4105-8157-A363-9EF9-51D5D85DD61F}"/>
               </a:ext>
             </a:extLst>
           </p:cNvPr>
@@ -3679,20 +3615,27 @@
             <p:ph type="title"/>
           </p:nvPr>
         </p:nvSpPr>
-        <p:spPr/>
+        <p:spPr>
+          <a:xfrm>
+            <a:off x="0" y="0"/>
+            <a:ext cx="12192000" cy="1020418"/>
+          </a:xfrm>
+        </p:spPr>
         <p:txBody>
           <a:bodyPr>
-            <a:normAutofit/>
+            <a:normAutofit fontScale="90000"/>
           </a:bodyPr>
           <a:lstStyle/>
           <a:p>
+            <a:pPr algn="ctr"/>
             <a:r>
               <a:rPr lang="en-US" b="1" dirty="0">
                 <a:solidFill>
                   <a:schemeClr val="bg1"/>
                 </a:solidFill>
+                <a:latin typeface="Copperplate Gothic Bold" panose="020E0705020206020404" pitchFamily="34" charset="0"/>
               </a:rPr>
-              <a:t>Interactive Dashboard for the New Aviation Division</a:t>
+              <a:t>Indicative Low Risk Aircraft Shortlist</a:t>
             </a:r>
           </a:p>
         </p:txBody>
@@ -3702,7 +3645,7 @@
           <p:cNvPr id="3" name="Content Placeholder 2">
             <a:extLst>
               <a:ext uri="{FF2B5EF4-FFF2-40B4-BE49-F238E27FC236}">
-                <a16:creationId xmlns:a16="http://schemas.microsoft.com/office/drawing/2014/main" id="{9297BF5D-BE62-CDF3-82B9-BE96139E3ED5}"/>
+                <a16:creationId xmlns:a16="http://schemas.microsoft.com/office/drawing/2014/main" id="{968A881A-1B70-FD54-C32B-AB3A33F0A648}"/>
               </a:ext>
             </a:extLst>
           </p:cNvPr>
@@ -3713,39 +3656,99 @@
             <p:ph idx="1"/>
           </p:nvPr>
         </p:nvSpPr>
-        <p:spPr/>
+        <p:spPr>
+          <a:xfrm>
+            <a:off x="838200" y="1020418"/>
+            <a:ext cx="10515600" cy="5156545"/>
+          </a:xfrm>
+        </p:spPr>
         <p:txBody>
           <a:bodyPr>
-            <a:normAutofit fontScale="92500" lnSpcReduction="20000"/>
+            <a:normAutofit lnSpcReduction="10000"/>
           </a:bodyPr>
           <a:lstStyle/>
           <a:p>
-            <a:pPr marL="0" indent="0">
-              <a:buNone/>
-            </a:pPr>
-            <a:r>
-              <a:rPr lang="en-US" dirty="0">
+            <a:r>
+              <a:rPr lang="en-US" sz="3600" dirty="0">
                 <a:solidFill>
                   <a:schemeClr val="bg1"/>
                 </a:solidFill>
               </a:rPr>
-              <a:t>To support deeper exploration of the </a:t>
-            </a:r>
-            <a:r>
-              <a:rPr lang="en-US" dirty="0" err="1">
+              <a:t>Cessna 172</a:t>
+            </a:r>
+          </a:p>
+          <a:p>
+            <a:pPr marL="0" indent="0">
+              <a:buNone/>
+            </a:pPr>
+            <a:endParaRPr lang="en-US" sz="3600" dirty="0">
+              <a:solidFill>
+                <a:schemeClr val="bg1"/>
+              </a:solidFill>
+            </a:endParaRPr>
+          </a:p>
+          <a:p>
+            <a:r>
+              <a:rPr lang="en-US" sz="3600" dirty="0">
                 <a:solidFill>
                   <a:schemeClr val="bg1"/>
                 </a:solidFill>
               </a:rPr>
-              <a:t>findiings</a:t>
-            </a:r>
-            <a:r>
-              <a:rPr lang="en-US" dirty="0">
+              <a:t>Cessna 182</a:t>
+            </a:r>
+          </a:p>
+          <a:p>
+            <a:pPr marL="0" indent="0">
+              <a:buNone/>
+            </a:pPr>
+            <a:endParaRPr lang="en-US" sz="3600" dirty="0">
+              <a:solidFill>
+                <a:schemeClr val="bg1"/>
+              </a:solidFill>
+            </a:endParaRPr>
+          </a:p>
+          <a:p>
+            <a:r>
+              <a:rPr lang="en-US" sz="3600" dirty="0">
                 <a:solidFill>
                   <a:schemeClr val="bg1"/>
                 </a:solidFill>
               </a:rPr>
-              <a:t>, an interactive dashboard has been developed in Tableau.</a:t>
+              <a:t>Piper PA-28</a:t>
+            </a:r>
+          </a:p>
+          <a:p>
+            <a:endParaRPr lang="en-US" sz="3600" dirty="0">
+              <a:solidFill>
+                <a:schemeClr val="bg1"/>
+              </a:solidFill>
+            </a:endParaRPr>
+          </a:p>
+          <a:p>
+            <a:r>
+              <a:rPr lang="en-US" sz="3600" dirty="0">
+                <a:solidFill>
+                  <a:schemeClr val="bg1"/>
+                </a:solidFill>
+              </a:rPr>
+              <a:t>Beechcraft Bonanza</a:t>
+            </a:r>
+          </a:p>
+          <a:p>
+            <a:endParaRPr lang="en-US" sz="3600" dirty="0">
+              <a:solidFill>
+                <a:schemeClr val="bg1"/>
+              </a:solidFill>
+            </a:endParaRPr>
+          </a:p>
+          <a:p>
+            <a:r>
+              <a:rPr lang="en-US" sz="3600" dirty="0">
+                <a:solidFill>
+                  <a:schemeClr val="bg1"/>
+                </a:solidFill>
+              </a:rPr>
+              <a:t>Diamond DA40</a:t>
             </a:r>
           </a:p>
           <a:p>
@@ -3759,78 +3762,6 @@
             </a:endParaRPr>
           </a:p>
           <a:p>
-            <a:pPr marL="0" indent="0">
-              <a:buNone/>
-            </a:pPr>
-            <a:r>
-              <a:rPr lang="en-US" dirty="0">
-                <a:solidFill>
-                  <a:schemeClr val="bg1"/>
-                </a:solidFill>
-              </a:rPr>
-              <a:t>This dashboard will allow the New Aviation Division to:</a:t>
-            </a:r>
-          </a:p>
-          <a:p>
-            <a:r>
-              <a:rPr lang="en-US" dirty="0">
-                <a:solidFill>
-                  <a:schemeClr val="bg1"/>
-                </a:solidFill>
-              </a:rPr>
-              <a:t>Explore accidents trend over time</a:t>
-            </a:r>
-          </a:p>
-          <a:p>
-            <a:r>
-              <a:rPr lang="en-US" dirty="0">
-                <a:solidFill>
-                  <a:schemeClr val="bg1"/>
-                </a:solidFill>
-              </a:rPr>
-              <a:t>Compare aircraft models by risk and severity</a:t>
-            </a:r>
-          </a:p>
-          <a:p>
-            <a:r>
-              <a:rPr lang="en-US" dirty="0">
-                <a:solidFill>
-                  <a:schemeClr val="bg1"/>
-                </a:solidFill>
-              </a:rPr>
-              <a:t>Filter results by aircraft type and operational factors</a:t>
-            </a:r>
-          </a:p>
-          <a:p>
-            <a:pPr marL="0" indent="0">
-              <a:buNone/>
-            </a:pPr>
-            <a:r>
-              <a:rPr lang="en-US" dirty="0">
-                <a:solidFill>
-                  <a:schemeClr val="bg1"/>
-                </a:solidFill>
-              </a:rPr>
-              <a:t>Access the live dashboard here:</a:t>
-            </a:r>
-          </a:p>
-          <a:p>
-            <a:pPr marL="0" indent="0">
-              <a:buNone/>
-            </a:pPr>
-            <a:r>
-              <a:rPr lang="en-US" dirty="0">
-                <a:solidFill>
-                  <a:srgbClr val="92D050"/>
-                </a:solidFill>
-              </a:rPr>
-              <a:t>https://public.tableau.com/app/profile/brian.chairo/viz/New-Aviation-LowRisk-AircraftPurchase-Project-InteractiveDashboard/LowRiskAircraftDashboard</a:t>
-            </a:r>
-          </a:p>
-          <a:p>
-            <a:pPr marL="0" indent="0">
-              <a:buNone/>
-            </a:pPr>
             <a:endParaRPr lang="en-US" dirty="0">
               <a:solidFill>
                 <a:schemeClr val="bg1"/>
@@ -3842,1081 +3773,7 @@
     </p:spTree>
     <p:extLst>
       <p:ext uri="{BB962C8B-B14F-4D97-AF65-F5344CB8AC3E}">
-        <p14:creationId xmlns:p14="http://schemas.microsoft.com/office/powerpoint/2010/main" val="656139331"/>
-      </p:ext>
-    </p:extLst>
-  </p:cSld>
-  <p:clrMapOvr>
-    <a:masterClrMapping/>
-  </p:clrMapOvr>
-</p:sld>
-</file>
-
-<file path=ppt/slides/slide11.xml><?xml version="1.0" encoding="utf-8"?>
-<p:sld xmlns:a="http://schemas.openxmlformats.org/drawingml/2006/main" xmlns:r="http://schemas.openxmlformats.org/officeDocument/2006/relationships" xmlns:p="http://schemas.openxmlformats.org/presentationml/2006/main">
-  <p:cSld>
-    <p:spTree>
-      <p:nvGrpSpPr>
-        <p:cNvPr id="1" name=""/>
-        <p:cNvGrpSpPr/>
-        <p:nvPr/>
-      </p:nvGrpSpPr>
-      <p:grpSpPr>
-        <a:xfrm>
-          <a:off x="0" y="0"/>
-          <a:ext cx="0" cy="0"/>
-          <a:chOff x="0" y="0"/>
-          <a:chExt cx="0" cy="0"/>
-        </a:xfrm>
-      </p:grpSpPr>
-      <p:sp>
-        <p:nvSpPr>
-          <p:cNvPr id="2" name="Title 1">
-            <a:extLst>
-              <a:ext uri="{FF2B5EF4-FFF2-40B4-BE49-F238E27FC236}">
-                <a16:creationId xmlns:a16="http://schemas.microsoft.com/office/drawing/2014/main" id="{965C4105-8157-A363-9EF9-51D5D85DD61F}"/>
-              </a:ext>
-            </a:extLst>
-          </p:cNvPr>
-          <p:cNvSpPr>
-            <a:spLocks noGrp="1"/>
-          </p:cNvSpPr>
-          <p:nvPr>
-            <p:ph type="title"/>
-          </p:nvPr>
-        </p:nvSpPr>
-        <p:spPr>
-          <a:xfrm>
-            <a:off x="0" y="0"/>
-            <a:ext cx="12192000" cy="1020418"/>
-          </a:xfrm>
-        </p:spPr>
-        <p:txBody>
-          <a:bodyPr>
-            <a:normAutofit/>
-          </a:bodyPr>
-          <a:lstStyle/>
-          <a:p>
-            <a:pPr algn="ctr"/>
-            <a:r>
-              <a:rPr lang="en-US" b="1" dirty="0">
-                <a:solidFill>
-                  <a:schemeClr val="bg1"/>
-                </a:solidFill>
-              </a:rPr>
-              <a:t>What this means to the New Aviation Division</a:t>
-            </a:r>
-          </a:p>
-        </p:txBody>
-      </p:sp>
-      <p:sp>
-        <p:nvSpPr>
-          <p:cNvPr id="3" name="Content Placeholder 2">
-            <a:extLst>
-              <a:ext uri="{FF2B5EF4-FFF2-40B4-BE49-F238E27FC236}">
-                <a16:creationId xmlns:a16="http://schemas.microsoft.com/office/drawing/2014/main" id="{968A881A-1B70-FD54-C32B-AB3A33F0A648}"/>
-              </a:ext>
-            </a:extLst>
-          </p:cNvPr>
-          <p:cNvSpPr>
-            <a:spLocks noGrp="1"/>
-          </p:cNvSpPr>
-          <p:nvPr>
-            <p:ph idx="1"/>
-          </p:nvPr>
-        </p:nvSpPr>
-        <p:spPr>
-          <a:xfrm>
-            <a:off x="838200" y="1020418"/>
-            <a:ext cx="10515600" cy="5156545"/>
-          </a:xfrm>
-        </p:spPr>
-        <p:txBody>
-          <a:bodyPr/>
-          <a:lstStyle/>
-          <a:p>
-            <a:r>
-              <a:rPr lang="en-US" dirty="0">
-                <a:solidFill>
-                  <a:schemeClr val="bg1"/>
-                </a:solidFill>
-              </a:rPr>
-              <a:t>Data supports: </a:t>
-            </a:r>
-          </a:p>
-          <a:p>
-            <a:pPr lvl="1"/>
-            <a:r>
-              <a:rPr lang="en-US" dirty="0">
-                <a:solidFill>
-                  <a:schemeClr val="bg1"/>
-                </a:solidFill>
-              </a:rPr>
-              <a:t>Reduced operational risk</a:t>
-            </a:r>
-          </a:p>
-          <a:p>
-            <a:pPr lvl="1"/>
-            <a:r>
-              <a:rPr lang="en-US" dirty="0">
-                <a:solidFill>
-                  <a:schemeClr val="bg1"/>
-                </a:solidFill>
-              </a:rPr>
-              <a:t>Better capital allocation</a:t>
-            </a:r>
-          </a:p>
-          <a:p>
-            <a:pPr lvl="1"/>
-            <a:r>
-              <a:rPr lang="en-US" dirty="0">
-                <a:solidFill>
-                  <a:schemeClr val="bg1"/>
-                </a:solidFill>
-              </a:rPr>
-              <a:t>Informed aircraft acquisition</a:t>
-            </a:r>
-          </a:p>
-          <a:p>
-            <a:r>
-              <a:rPr lang="en-US" dirty="0">
-                <a:solidFill>
-                  <a:schemeClr val="bg1"/>
-                </a:solidFill>
-              </a:rPr>
-              <a:t>Transforms purchasing decisions from intuition to insight</a:t>
-            </a:r>
-          </a:p>
-          <a:p>
-            <a:pPr marL="0" indent="0">
-              <a:buNone/>
-            </a:pPr>
-            <a:r>
-              <a:rPr lang="en-US" dirty="0">
-                <a:solidFill>
-                  <a:schemeClr val="bg1"/>
-                </a:solidFill>
-              </a:rPr>
-              <a:t>This approach aligns safely with financial sustainability.</a:t>
-            </a:r>
-          </a:p>
-          <a:p>
-            <a:endParaRPr lang="en-US" dirty="0">
-              <a:solidFill>
-                <a:schemeClr val="bg1"/>
-              </a:solidFill>
-            </a:endParaRPr>
-          </a:p>
-        </p:txBody>
-      </p:sp>
-    </p:spTree>
-    <p:extLst>
-      <p:ext uri="{BB962C8B-B14F-4D97-AF65-F5344CB8AC3E}">
         <p14:creationId xmlns:p14="http://schemas.microsoft.com/office/powerpoint/2010/main" val="4076705738"/>
-      </p:ext>
-    </p:extLst>
-  </p:cSld>
-  <p:clrMapOvr>
-    <a:masterClrMapping/>
-  </p:clrMapOvr>
-</p:sld>
-</file>
-
-<file path=ppt/slides/slide12.xml><?xml version="1.0" encoding="utf-8"?>
-<p:sld xmlns:a="http://schemas.openxmlformats.org/drawingml/2006/main" xmlns:r="http://schemas.openxmlformats.org/officeDocument/2006/relationships" xmlns:p="http://schemas.openxmlformats.org/presentationml/2006/main">
-  <p:cSld>
-    <p:spTree>
-      <p:nvGrpSpPr>
-        <p:cNvPr id="1" name=""/>
-        <p:cNvGrpSpPr/>
-        <p:nvPr/>
-      </p:nvGrpSpPr>
-      <p:grpSpPr>
-        <a:xfrm>
-          <a:off x="0" y="0"/>
-          <a:ext cx="0" cy="0"/>
-          <a:chOff x="0" y="0"/>
-          <a:chExt cx="0" cy="0"/>
-        </a:xfrm>
-      </p:grpSpPr>
-      <p:sp>
-        <p:nvSpPr>
-          <p:cNvPr id="2" name="Title 1">
-            <a:extLst>
-              <a:ext uri="{FF2B5EF4-FFF2-40B4-BE49-F238E27FC236}">
-                <a16:creationId xmlns:a16="http://schemas.microsoft.com/office/drawing/2014/main" id="{59562D79-00AD-C5E7-BB82-7A0C4BD74BC6}"/>
-              </a:ext>
-            </a:extLst>
-          </p:cNvPr>
-          <p:cNvSpPr>
-            <a:spLocks noGrp="1"/>
-          </p:cNvSpPr>
-          <p:nvPr>
-            <p:ph type="title"/>
-          </p:nvPr>
-        </p:nvSpPr>
-        <p:spPr/>
-        <p:txBody>
-          <a:bodyPr/>
-          <a:lstStyle/>
-          <a:p>
-            <a:pPr algn="ctr"/>
-            <a:r>
-              <a:rPr lang="en-US" b="1" dirty="0">
-                <a:solidFill>
-                  <a:schemeClr val="bg1"/>
-                </a:solidFill>
-              </a:rPr>
-              <a:t>Limitations &amp; Considerations</a:t>
-            </a:r>
-          </a:p>
-        </p:txBody>
-      </p:sp>
-      <p:sp>
-        <p:nvSpPr>
-          <p:cNvPr id="3" name="Content Placeholder 2">
-            <a:extLst>
-              <a:ext uri="{FF2B5EF4-FFF2-40B4-BE49-F238E27FC236}">
-                <a16:creationId xmlns:a16="http://schemas.microsoft.com/office/drawing/2014/main" id="{743FA965-027B-F13B-E84D-CB66EAF3FE19}"/>
-              </a:ext>
-            </a:extLst>
-          </p:cNvPr>
-          <p:cNvSpPr>
-            <a:spLocks noGrp="1"/>
-          </p:cNvSpPr>
-          <p:nvPr>
-            <p:ph idx="1"/>
-          </p:nvPr>
-        </p:nvSpPr>
-        <p:spPr/>
-        <p:txBody>
-          <a:bodyPr>
-            <a:normAutofit lnSpcReduction="10000"/>
-          </a:bodyPr>
-          <a:lstStyle/>
-          <a:p>
-            <a:pPr marL="0" indent="0">
-              <a:buNone/>
-            </a:pPr>
-            <a:r>
-              <a:rPr lang="en-US" b="1" dirty="0">
-                <a:solidFill>
-                  <a:schemeClr val="bg1"/>
-                </a:solidFill>
-              </a:rPr>
-              <a:t>Important Considerations</a:t>
-            </a:r>
-          </a:p>
-          <a:p>
-            <a:r>
-              <a:rPr lang="en-US" b="1" dirty="0">
-                <a:solidFill>
-                  <a:schemeClr val="bg1"/>
-                </a:solidFill>
-              </a:rPr>
-              <a:t>Accident data does not include:</a:t>
-            </a:r>
-          </a:p>
-          <a:p>
-            <a:pPr lvl="1"/>
-            <a:r>
-              <a:rPr lang="en-US" b="1" dirty="0">
-                <a:solidFill>
-                  <a:schemeClr val="bg1"/>
-                </a:solidFill>
-              </a:rPr>
-              <a:t>Total flight hours per model</a:t>
-            </a:r>
-          </a:p>
-          <a:p>
-            <a:pPr lvl="1"/>
-            <a:r>
-              <a:rPr lang="en-US" b="1" dirty="0" err="1">
-                <a:solidFill>
-                  <a:schemeClr val="bg1"/>
-                </a:solidFill>
-              </a:rPr>
-              <a:t>Maintainance</a:t>
-            </a:r>
-            <a:r>
-              <a:rPr lang="en-US" b="1" dirty="0">
-                <a:solidFill>
-                  <a:schemeClr val="bg1"/>
-                </a:solidFill>
-              </a:rPr>
-              <a:t> records</a:t>
-            </a:r>
-          </a:p>
-          <a:p>
-            <a:r>
-              <a:rPr lang="en-US" b="1" dirty="0">
-                <a:solidFill>
-                  <a:schemeClr val="bg1"/>
-                </a:solidFill>
-              </a:rPr>
-              <a:t>Result should compliment</a:t>
-            </a:r>
-          </a:p>
-          <a:p>
-            <a:pPr lvl="1"/>
-            <a:r>
-              <a:rPr lang="en-US" b="1" dirty="0">
-                <a:solidFill>
-                  <a:schemeClr val="bg1"/>
-                </a:solidFill>
-              </a:rPr>
-              <a:t>Manufacturers guidance</a:t>
-            </a:r>
-          </a:p>
-          <a:p>
-            <a:pPr lvl="1"/>
-            <a:r>
-              <a:rPr lang="en-US" b="1" dirty="0">
-                <a:solidFill>
-                  <a:schemeClr val="bg1"/>
-                </a:solidFill>
-              </a:rPr>
-              <a:t>Regulatory </a:t>
-            </a:r>
-            <a:r>
-              <a:rPr lang="en-US" b="1" dirty="0" err="1">
-                <a:solidFill>
-                  <a:schemeClr val="bg1"/>
-                </a:solidFill>
-              </a:rPr>
-              <a:t>assesments</a:t>
-            </a:r>
-            <a:endParaRPr lang="en-US" b="1" dirty="0">
-              <a:solidFill>
-                <a:schemeClr val="bg1"/>
-              </a:solidFill>
-            </a:endParaRPr>
-          </a:p>
-          <a:p>
-            <a:pPr lvl="1"/>
-            <a:r>
-              <a:rPr lang="en-US" b="1" dirty="0">
-                <a:solidFill>
-                  <a:schemeClr val="bg1"/>
-                </a:solidFill>
-              </a:rPr>
-              <a:t>Operational requirements</a:t>
-            </a:r>
-          </a:p>
-          <a:p>
-            <a:pPr lvl="1"/>
-            <a:endParaRPr lang="en-US" b="1" dirty="0">
-              <a:solidFill>
-                <a:schemeClr val="bg1"/>
-              </a:solidFill>
-            </a:endParaRPr>
-          </a:p>
-          <a:p>
-            <a:pPr marL="0" indent="0">
-              <a:buNone/>
-            </a:pPr>
-            <a:r>
-              <a:rPr lang="en-US" b="1" dirty="0">
-                <a:solidFill>
-                  <a:schemeClr val="bg1"/>
-                </a:solidFill>
-              </a:rPr>
-              <a:t>This analysis informs decisions it however does not replace due diligence</a:t>
-            </a:r>
-          </a:p>
-          <a:p>
-            <a:pPr lvl="1"/>
-            <a:endParaRPr lang="en-US" b="1" dirty="0">
-              <a:solidFill>
-                <a:schemeClr val="bg1"/>
-              </a:solidFill>
-            </a:endParaRPr>
-          </a:p>
-        </p:txBody>
-      </p:sp>
-    </p:spTree>
-    <p:extLst>
-      <p:ext uri="{BB962C8B-B14F-4D97-AF65-F5344CB8AC3E}">
-        <p14:creationId xmlns:p14="http://schemas.microsoft.com/office/powerpoint/2010/main" val="2077427788"/>
-      </p:ext>
-    </p:extLst>
-  </p:cSld>
-  <p:clrMapOvr>
-    <a:masterClrMapping/>
-  </p:clrMapOvr>
-</p:sld>
-</file>
-
-<file path=ppt/slides/slide13.xml><?xml version="1.0" encoding="utf-8"?>
-<p:sld xmlns:a="http://schemas.openxmlformats.org/drawingml/2006/main" xmlns:r="http://schemas.openxmlformats.org/officeDocument/2006/relationships" xmlns:p="http://schemas.openxmlformats.org/presentationml/2006/main">
-  <p:cSld>
-    <p:spTree>
-      <p:nvGrpSpPr>
-        <p:cNvPr id="1" name=""/>
-        <p:cNvGrpSpPr/>
-        <p:nvPr/>
-      </p:nvGrpSpPr>
-      <p:grpSpPr>
-        <a:xfrm>
-          <a:off x="0" y="0"/>
-          <a:ext cx="0" cy="0"/>
-          <a:chOff x="0" y="0"/>
-          <a:chExt cx="0" cy="0"/>
-        </a:xfrm>
-      </p:grpSpPr>
-      <p:sp>
-        <p:nvSpPr>
-          <p:cNvPr id="2" name="Title 1">
-            <a:extLst>
-              <a:ext uri="{FF2B5EF4-FFF2-40B4-BE49-F238E27FC236}">
-                <a16:creationId xmlns:a16="http://schemas.microsoft.com/office/drawing/2014/main" id="{E918EA96-13A3-B727-73E1-18F2DE778803}"/>
-              </a:ext>
-            </a:extLst>
-          </p:cNvPr>
-          <p:cNvSpPr>
-            <a:spLocks noGrp="1"/>
-          </p:cNvSpPr>
-          <p:nvPr>
-            <p:ph type="title"/>
-          </p:nvPr>
-        </p:nvSpPr>
-        <p:spPr>
-          <a:xfrm>
-            <a:off x="0" y="0"/>
-            <a:ext cx="12192000" cy="681038"/>
-          </a:xfrm>
-        </p:spPr>
-        <p:txBody>
-          <a:bodyPr>
-            <a:normAutofit fontScale="90000"/>
-          </a:bodyPr>
-          <a:lstStyle/>
-          <a:p>
-            <a:pPr algn="ctr"/>
-            <a:r>
-              <a:rPr lang="en-US" b="1" dirty="0">
-                <a:solidFill>
-                  <a:schemeClr val="bg1"/>
-                </a:solidFill>
-              </a:rPr>
-              <a:t>Recommendations</a:t>
-            </a:r>
-          </a:p>
-        </p:txBody>
-      </p:sp>
-      <p:sp>
-        <p:nvSpPr>
-          <p:cNvPr id="3" name="Content Placeholder 2">
-            <a:extLst>
-              <a:ext uri="{FF2B5EF4-FFF2-40B4-BE49-F238E27FC236}">
-                <a16:creationId xmlns:a16="http://schemas.microsoft.com/office/drawing/2014/main" id="{E51EED7F-9D23-CF91-25BE-018F0DA443B6}"/>
-              </a:ext>
-            </a:extLst>
-          </p:cNvPr>
-          <p:cNvSpPr>
-            <a:spLocks noGrp="1"/>
-          </p:cNvSpPr>
-          <p:nvPr>
-            <p:ph idx="1"/>
-          </p:nvPr>
-        </p:nvSpPr>
-        <p:spPr>
-          <a:xfrm>
-            <a:off x="838200" y="1073426"/>
-            <a:ext cx="10515600" cy="5103537"/>
-          </a:xfrm>
-        </p:spPr>
-        <p:txBody>
-          <a:bodyPr>
-            <a:normAutofit fontScale="92500" lnSpcReduction="20000"/>
-          </a:bodyPr>
-          <a:lstStyle/>
-          <a:p>
-            <a:pPr marL="0" indent="0">
-              <a:buNone/>
-            </a:pPr>
-            <a:r>
-              <a:rPr lang="en-US" b="1" dirty="0">
-                <a:solidFill>
-                  <a:schemeClr val="bg1"/>
-                </a:solidFill>
-              </a:rPr>
-              <a:t>Strategic:</a:t>
-            </a:r>
-          </a:p>
-          <a:p>
-            <a:r>
-              <a:rPr lang="en-US" dirty="0">
-                <a:solidFill>
-                  <a:schemeClr val="bg1"/>
-                </a:solidFill>
-              </a:rPr>
-              <a:t>Prioritize aircraft with:</a:t>
-            </a:r>
-          </a:p>
-          <a:p>
-            <a:pPr lvl="1"/>
-            <a:r>
-              <a:rPr lang="en-US" dirty="0">
-                <a:solidFill>
-                  <a:schemeClr val="bg1"/>
-                </a:solidFill>
-              </a:rPr>
-              <a:t>Low injury severity</a:t>
-            </a:r>
-          </a:p>
-          <a:p>
-            <a:pPr lvl="1"/>
-            <a:r>
-              <a:rPr lang="en-US" dirty="0">
-                <a:solidFill>
-                  <a:schemeClr val="bg1"/>
-                </a:solidFill>
-              </a:rPr>
-              <a:t>Stable historical performance</a:t>
-            </a:r>
-          </a:p>
-          <a:p>
-            <a:r>
-              <a:rPr lang="en-US" dirty="0">
-                <a:solidFill>
-                  <a:schemeClr val="bg1"/>
-                </a:solidFill>
-              </a:rPr>
-              <a:t>Avoid decision based on anecdotal safety perception</a:t>
-            </a:r>
-          </a:p>
-          <a:p>
-            <a:r>
-              <a:rPr lang="en-US" dirty="0">
-                <a:solidFill>
-                  <a:schemeClr val="bg1"/>
-                </a:solidFill>
-              </a:rPr>
-              <a:t>Integrate severity based metrics into procurement policy for the New Aviation Division</a:t>
-            </a:r>
-          </a:p>
-          <a:p>
-            <a:r>
-              <a:rPr lang="en-US" dirty="0">
-                <a:solidFill>
-                  <a:schemeClr val="bg1"/>
-                </a:solidFill>
-              </a:rPr>
-              <a:t>Use dashboard during:</a:t>
-            </a:r>
-          </a:p>
-          <a:p>
-            <a:pPr lvl="1"/>
-            <a:r>
-              <a:rPr lang="en-US" dirty="0">
-                <a:solidFill>
-                  <a:schemeClr val="bg1"/>
-                </a:solidFill>
-              </a:rPr>
-              <a:t>Purchase planning</a:t>
-            </a:r>
-          </a:p>
-          <a:p>
-            <a:pPr lvl="1"/>
-            <a:r>
-              <a:rPr lang="en-US" dirty="0" err="1">
-                <a:solidFill>
-                  <a:schemeClr val="bg1"/>
-                </a:solidFill>
-              </a:rPr>
-              <a:t>Continous</a:t>
-            </a:r>
-            <a:r>
-              <a:rPr lang="en-US" dirty="0">
-                <a:solidFill>
-                  <a:schemeClr val="bg1"/>
-                </a:solidFill>
-              </a:rPr>
-              <a:t> risk reassessment reviews</a:t>
-            </a:r>
-          </a:p>
-          <a:p>
-            <a:r>
-              <a:rPr lang="en-US" dirty="0">
-                <a:solidFill>
-                  <a:schemeClr val="bg1"/>
-                </a:solidFill>
-              </a:rPr>
-              <a:t>Update analysis as new data becomes available</a:t>
-            </a:r>
-          </a:p>
-          <a:p>
-            <a:endParaRPr lang="en-US" dirty="0">
-              <a:solidFill>
-                <a:schemeClr val="bg1"/>
-              </a:solidFill>
-            </a:endParaRPr>
-          </a:p>
-          <a:p>
-            <a:endParaRPr lang="en-US" dirty="0">
-              <a:solidFill>
-                <a:schemeClr val="bg1"/>
-              </a:solidFill>
-            </a:endParaRPr>
-          </a:p>
-          <a:p>
-            <a:pPr marL="0" indent="0">
-              <a:buNone/>
-            </a:pPr>
-            <a:r>
-              <a:rPr lang="en-US" dirty="0">
-                <a:solidFill>
-                  <a:schemeClr val="bg1"/>
-                </a:solidFill>
-              </a:rPr>
-              <a:t>This framework is subject to evolve alongside the New Aviation Division</a:t>
-            </a:r>
-          </a:p>
-        </p:txBody>
-      </p:sp>
-    </p:spTree>
-    <p:extLst>
-      <p:ext uri="{BB962C8B-B14F-4D97-AF65-F5344CB8AC3E}">
-        <p14:creationId xmlns:p14="http://schemas.microsoft.com/office/powerpoint/2010/main" val="132692448"/>
-      </p:ext>
-    </p:extLst>
-  </p:cSld>
-  <p:clrMapOvr>
-    <a:masterClrMapping/>
-  </p:clrMapOvr>
-</p:sld>
-</file>
-
-<file path=ppt/slides/slide14.xml><?xml version="1.0" encoding="utf-8"?>
-<p:sld xmlns:a="http://schemas.openxmlformats.org/drawingml/2006/main" xmlns:r="http://schemas.openxmlformats.org/officeDocument/2006/relationships" xmlns:p="http://schemas.openxmlformats.org/presentationml/2006/main">
-  <p:cSld>
-    <p:spTree>
-      <p:nvGrpSpPr>
-        <p:cNvPr id="1" name=""/>
-        <p:cNvGrpSpPr/>
-        <p:nvPr/>
-      </p:nvGrpSpPr>
-      <p:grpSpPr>
-        <a:xfrm>
-          <a:off x="0" y="0"/>
-          <a:ext cx="0" cy="0"/>
-          <a:chOff x="0" y="0"/>
-          <a:chExt cx="0" cy="0"/>
-        </a:xfrm>
-      </p:grpSpPr>
-      <p:sp>
-        <p:nvSpPr>
-          <p:cNvPr id="2" name="Title 1">
-            <a:extLst>
-              <a:ext uri="{FF2B5EF4-FFF2-40B4-BE49-F238E27FC236}">
-                <a16:creationId xmlns:a16="http://schemas.microsoft.com/office/drawing/2014/main" id="{5FF0A359-654D-2055-1946-15E876A6CDFD}"/>
-              </a:ext>
-            </a:extLst>
-          </p:cNvPr>
-          <p:cNvSpPr>
-            <a:spLocks noGrp="1"/>
-          </p:cNvSpPr>
-          <p:nvPr>
-            <p:ph type="title"/>
-          </p:nvPr>
-        </p:nvSpPr>
-        <p:spPr>
-          <a:xfrm>
-            <a:off x="92765" y="1"/>
-            <a:ext cx="12099235" cy="1060173"/>
-          </a:xfrm>
-        </p:spPr>
-        <p:txBody>
-          <a:bodyPr/>
-          <a:lstStyle/>
-          <a:p>
-            <a:pPr algn="ctr"/>
-            <a:r>
-              <a:rPr lang="en-US" b="1" dirty="0">
-                <a:solidFill>
-                  <a:schemeClr val="bg1"/>
-                </a:solidFill>
-              </a:rPr>
-              <a:t>Conclusion</a:t>
-            </a:r>
-          </a:p>
-        </p:txBody>
-      </p:sp>
-      <p:sp>
-        <p:nvSpPr>
-          <p:cNvPr id="3" name="Content Placeholder 2">
-            <a:extLst>
-              <a:ext uri="{FF2B5EF4-FFF2-40B4-BE49-F238E27FC236}">
-                <a16:creationId xmlns:a16="http://schemas.microsoft.com/office/drawing/2014/main" id="{B2395DED-8699-5EE0-651E-B84E539FC502}"/>
-              </a:ext>
-            </a:extLst>
-          </p:cNvPr>
-          <p:cNvSpPr>
-            <a:spLocks noGrp="1"/>
-          </p:cNvSpPr>
-          <p:nvPr>
-            <p:ph idx="1"/>
-          </p:nvPr>
-        </p:nvSpPr>
-        <p:spPr>
-          <a:xfrm>
-            <a:off x="838200" y="1311965"/>
-            <a:ext cx="10515600" cy="4864998"/>
-          </a:xfrm>
-        </p:spPr>
-        <p:txBody>
-          <a:bodyPr/>
-          <a:lstStyle/>
-          <a:p>
-            <a:pPr marL="0" indent="0">
-              <a:buNone/>
-            </a:pPr>
-            <a:r>
-              <a:rPr lang="en-US" b="1" dirty="0">
-                <a:solidFill>
-                  <a:schemeClr val="bg1"/>
-                </a:solidFill>
-              </a:rPr>
-              <a:t>Final Takeaway</a:t>
-            </a:r>
-          </a:p>
-          <a:p>
-            <a:r>
-              <a:rPr lang="en-US" b="1" dirty="0">
-                <a:solidFill>
-                  <a:schemeClr val="bg1"/>
-                </a:solidFill>
-              </a:rPr>
-              <a:t>Historical safety data provides powerful insights</a:t>
-            </a:r>
-          </a:p>
-          <a:p>
-            <a:r>
-              <a:rPr lang="en-US" b="1" dirty="0">
-                <a:solidFill>
-                  <a:schemeClr val="bg1"/>
-                </a:solidFill>
-              </a:rPr>
-              <a:t>Low risk aircraft can be identified objectively</a:t>
-            </a:r>
-          </a:p>
-          <a:p>
-            <a:r>
-              <a:rPr lang="en-US" b="1" dirty="0">
-                <a:solidFill>
-                  <a:schemeClr val="bg1"/>
-                </a:solidFill>
-              </a:rPr>
-              <a:t>Data driven purchases reduces </a:t>
-            </a:r>
-            <a:r>
-              <a:rPr lang="en-US" b="1" dirty="0" err="1">
-                <a:solidFill>
-                  <a:schemeClr val="bg1"/>
-                </a:solidFill>
-              </a:rPr>
-              <a:t>uncertainity</a:t>
-            </a:r>
-            <a:r>
-              <a:rPr lang="en-US" b="1" dirty="0">
-                <a:solidFill>
-                  <a:schemeClr val="bg1"/>
-                </a:solidFill>
-              </a:rPr>
-              <a:t> and risk</a:t>
-            </a:r>
-          </a:p>
-          <a:p>
-            <a:endParaRPr lang="en-US" b="1" dirty="0">
-              <a:solidFill>
-                <a:schemeClr val="bg1"/>
-              </a:solidFill>
-            </a:endParaRPr>
-          </a:p>
-          <a:p>
-            <a:endParaRPr lang="en-US" b="1" dirty="0">
-              <a:solidFill>
-                <a:schemeClr val="bg1"/>
-              </a:solidFill>
-            </a:endParaRPr>
-          </a:p>
-          <a:p>
-            <a:endParaRPr lang="en-US" b="1" dirty="0">
-              <a:solidFill>
-                <a:schemeClr val="bg1"/>
-              </a:solidFill>
-            </a:endParaRPr>
-          </a:p>
-          <a:p>
-            <a:pPr marL="0" indent="0">
-              <a:buNone/>
-            </a:pPr>
-            <a:r>
-              <a:rPr lang="en-US" b="1" dirty="0">
-                <a:solidFill>
-                  <a:schemeClr val="bg1"/>
-                </a:solidFill>
-              </a:rPr>
-              <a:t>This risk analysis demonstrates how analytics can directly support strategic </a:t>
-            </a:r>
-            <a:r>
-              <a:rPr lang="en-US" b="1">
-                <a:solidFill>
-                  <a:schemeClr val="bg1"/>
-                </a:solidFill>
-              </a:rPr>
-              <a:t>investment decisions.</a:t>
-            </a:r>
-            <a:endParaRPr lang="en-US" b="1" dirty="0">
-              <a:solidFill>
-                <a:schemeClr val="bg1"/>
-              </a:solidFill>
-            </a:endParaRPr>
-          </a:p>
-        </p:txBody>
-      </p:sp>
-    </p:spTree>
-    <p:extLst>
-      <p:ext uri="{BB962C8B-B14F-4D97-AF65-F5344CB8AC3E}">
-        <p14:creationId xmlns:p14="http://schemas.microsoft.com/office/powerpoint/2010/main" val="334627211"/>
-      </p:ext>
-    </p:extLst>
-  </p:cSld>
-  <p:clrMapOvr>
-    <a:masterClrMapping/>
-  </p:clrMapOvr>
-</p:sld>
-</file>
-
-<file path=ppt/slides/slide15.xml><?xml version="1.0" encoding="utf-8"?>
-<p:sld xmlns:a="http://schemas.openxmlformats.org/drawingml/2006/main" xmlns:r="http://schemas.openxmlformats.org/officeDocument/2006/relationships" xmlns:p="http://schemas.openxmlformats.org/presentationml/2006/main">
-  <p:cSld>
-    <p:spTree>
-      <p:nvGrpSpPr>
-        <p:cNvPr id="1" name=""/>
-        <p:cNvGrpSpPr/>
-        <p:nvPr/>
-      </p:nvGrpSpPr>
-      <p:grpSpPr>
-        <a:xfrm>
-          <a:off x="0" y="0"/>
-          <a:ext cx="0" cy="0"/>
-          <a:chOff x="0" y="0"/>
-          <a:chExt cx="0" cy="0"/>
-        </a:xfrm>
-      </p:grpSpPr>
-      <p:sp>
-        <p:nvSpPr>
-          <p:cNvPr id="2" name="Title 1">
-            <a:extLst>
-              <a:ext uri="{FF2B5EF4-FFF2-40B4-BE49-F238E27FC236}">
-                <a16:creationId xmlns:a16="http://schemas.microsoft.com/office/drawing/2014/main" id="{F620D89B-C4B5-88E2-F581-FFD2CB55A8B0}"/>
-              </a:ext>
-            </a:extLst>
-          </p:cNvPr>
-          <p:cNvSpPr>
-            <a:spLocks noGrp="1"/>
-          </p:cNvSpPr>
-          <p:nvPr>
-            <p:ph type="title"/>
-          </p:nvPr>
-        </p:nvSpPr>
-        <p:spPr/>
-        <p:txBody>
-          <a:bodyPr/>
-          <a:lstStyle/>
-          <a:p>
-            <a:r>
-              <a:rPr lang="en-US" dirty="0">
-                <a:solidFill>
-                  <a:schemeClr val="bg1"/>
-                </a:solidFill>
-              </a:rPr>
-              <a:t>Indicative Low Risk Aircraft Models</a:t>
-            </a:r>
-          </a:p>
-        </p:txBody>
-      </p:sp>
-      <p:sp>
-        <p:nvSpPr>
-          <p:cNvPr id="3" name="Content Placeholder 2">
-            <a:extLst>
-              <a:ext uri="{FF2B5EF4-FFF2-40B4-BE49-F238E27FC236}">
-                <a16:creationId xmlns:a16="http://schemas.microsoft.com/office/drawing/2014/main" id="{E0D8E287-FB69-E351-35EA-DA312393EBD0}"/>
-              </a:ext>
-            </a:extLst>
-          </p:cNvPr>
-          <p:cNvSpPr>
-            <a:spLocks noGrp="1"/>
-          </p:cNvSpPr>
-          <p:nvPr>
-            <p:ph idx="1"/>
-          </p:nvPr>
-        </p:nvSpPr>
-        <p:spPr/>
-        <p:txBody>
-          <a:bodyPr>
-            <a:normAutofit fontScale="85000" lnSpcReduction="20000"/>
-          </a:bodyPr>
-          <a:lstStyle/>
-          <a:p>
-            <a:r>
-              <a:rPr lang="en-US" dirty="0">
-                <a:solidFill>
-                  <a:schemeClr val="bg1"/>
-                </a:solidFill>
-              </a:rPr>
-              <a:t>The following models demonstrate:</a:t>
-            </a:r>
-          </a:p>
-          <a:p>
-            <a:pPr lvl="1"/>
-            <a:r>
-              <a:rPr lang="en-US" dirty="0">
-                <a:solidFill>
-                  <a:schemeClr val="bg1"/>
-                </a:solidFill>
-              </a:rPr>
-              <a:t>Repeated historical operation</a:t>
-            </a:r>
-          </a:p>
-          <a:p>
-            <a:pPr lvl="1"/>
-            <a:r>
-              <a:rPr lang="en-US" dirty="0">
-                <a:solidFill>
-                  <a:schemeClr val="bg1"/>
-                </a:solidFill>
-              </a:rPr>
-              <a:t>Very low fatality rates</a:t>
-            </a:r>
-          </a:p>
-          <a:p>
-            <a:pPr lvl="1"/>
-            <a:r>
-              <a:rPr lang="en-US" dirty="0">
-                <a:solidFill>
-                  <a:schemeClr val="bg1"/>
-                </a:solidFill>
-              </a:rPr>
-              <a:t>Low injury severity scores</a:t>
-            </a:r>
-          </a:p>
-          <a:p>
-            <a:pPr lvl="1"/>
-            <a:r>
-              <a:rPr lang="en-US" dirty="0">
-                <a:solidFill>
-                  <a:schemeClr val="bg1"/>
-                </a:solidFill>
-              </a:rPr>
-              <a:t>Sufficient accidents report to support confidence in results.</a:t>
-            </a:r>
-          </a:p>
-          <a:p>
-            <a:pPr marL="0" indent="0">
-              <a:buNone/>
-            </a:pPr>
-            <a:r>
-              <a:rPr lang="en-US" b="1" dirty="0">
-                <a:solidFill>
-                  <a:schemeClr val="bg1"/>
-                </a:solidFill>
-              </a:rPr>
-              <a:t>Shortlisted Aircrafts:</a:t>
-            </a:r>
-          </a:p>
-          <a:p>
-            <a:pPr>
-              <a:buFont typeface="Wingdings" panose="05000000000000000000" pitchFamily="2" charset="2"/>
-              <a:buChar char="ü"/>
-            </a:pPr>
-            <a:r>
-              <a:rPr lang="en-US" b="1" dirty="0">
-                <a:solidFill>
-                  <a:schemeClr val="bg1"/>
-                </a:solidFill>
-              </a:rPr>
-              <a:t>A300/ A300-600</a:t>
-            </a:r>
-          </a:p>
-          <a:p>
-            <a:pPr>
-              <a:buFont typeface="Wingdings" panose="05000000000000000000" pitchFamily="2" charset="2"/>
-              <a:buChar char="ü"/>
-            </a:pPr>
-            <a:r>
-              <a:rPr lang="en-US" b="1" dirty="0">
-                <a:solidFill>
-                  <a:schemeClr val="bg1"/>
-                </a:solidFill>
-              </a:rPr>
-              <a:t>A320-214</a:t>
-            </a:r>
-          </a:p>
-          <a:p>
-            <a:pPr>
-              <a:buFont typeface="Wingdings" panose="05000000000000000000" pitchFamily="2" charset="2"/>
-              <a:buChar char="ü"/>
-            </a:pPr>
-            <a:r>
-              <a:rPr lang="en-US" b="1" dirty="0">
-                <a:solidFill>
-                  <a:schemeClr val="bg1"/>
-                </a:solidFill>
-              </a:rPr>
-              <a:t>737-300 / 737-800</a:t>
-            </a:r>
-          </a:p>
-          <a:p>
-            <a:pPr>
-              <a:buFont typeface="Wingdings" panose="05000000000000000000" pitchFamily="2" charset="2"/>
-              <a:buChar char="ü"/>
-            </a:pPr>
-            <a:r>
-              <a:rPr lang="en-US" b="1" dirty="0">
-                <a:solidFill>
-                  <a:schemeClr val="bg1"/>
-                </a:solidFill>
-              </a:rPr>
-              <a:t>DC-10-40</a:t>
-            </a:r>
-          </a:p>
-          <a:p>
-            <a:pPr>
-              <a:buFont typeface="Wingdings" panose="05000000000000000000" pitchFamily="2" charset="2"/>
-              <a:buChar char="ü"/>
-            </a:pPr>
-            <a:r>
-              <a:rPr lang="en-US" b="1" dirty="0">
-                <a:solidFill>
-                  <a:schemeClr val="bg1"/>
-                </a:solidFill>
-              </a:rPr>
-              <a:t>ATR-72</a:t>
-            </a:r>
-          </a:p>
-          <a:p>
-            <a:pPr>
-              <a:buFont typeface="Wingdings" panose="05000000000000000000" pitchFamily="2" charset="2"/>
-              <a:buChar char="ü"/>
-            </a:pPr>
-            <a:r>
-              <a:rPr lang="en-US" b="1" dirty="0">
-                <a:solidFill>
-                  <a:schemeClr val="bg1"/>
-                </a:solidFill>
-              </a:rPr>
-              <a:t>DHC-2 MK. I (120A)</a:t>
-            </a:r>
-          </a:p>
-        </p:txBody>
-      </p:sp>
-    </p:spTree>
-    <p:extLst>
-      <p:ext uri="{BB962C8B-B14F-4D97-AF65-F5344CB8AC3E}">
-        <p14:creationId xmlns:p14="http://schemas.microsoft.com/office/powerpoint/2010/main" val="1608679004"/>
       </p:ext>
     </p:extLst>
   </p:cSld>
@@ -4970,8 +3827,9 @@
                 <a:solidFill>
                   <a:schemeClr val="bg1"/>
                 </a:solidFill>
+                <a:latin typeface="Copperplate Gothic Bold" panose="020E0705020206020404" pitchFamily="34" charset="0"/>
               </a:rPr>
-              <a:t>Project Objectives</a:t>
+              <a:t>Business Risk Context</a:t>
             </a:r>
           </a:p>
         </p:txBody>
@@ -4999,88 +3857,33 @@
           <a:p>
             <a:pPr lvl="1"/>
             <a:r>
-              <a:rPr lang="en-US" dirty="0">
+              <a:rPr lang="en-US" sz="3200" dirty="0">
                 <a:solidFill>
                   <a:schemeClr val="bg1"/>
                 </a:solidFill>
               </a:rPr>
-              <a:t>Identify aircrafts models with : </a:t>
-            </a:r>
-          </a:p>
-          <a:p>
-            <a:pPr lvl="2"/>
-            <a:r>
-              <a:rPr lang="en-US" dirty="0">
+              <a:t>Aircraft purchases involve high capital and long-term exposure.</a:t>
+            </a:r>
+          </a:p>
+          <a:p>
+            <a:pPr marL="457200" lvl="1" indent="0">
+              <a:buNone/>
+            </a:pPr>
+            <a:endParaRPr lang="en-US" sz="3200" dirty="0">
+              <a:solidFill>
+                <a:schemeClr val="bg1"/>
+              </a:solidFill>
+            </a:endParaRPr>
+          </a:p>
+          <a:p>
+            <a:pPr lvl="1"/>
+            <a:r>
+              <a:rPr lang="en-US" sz="3200" dirty="0">
                 <a:solidFill>
                   <a:schemeClr val="bg1"/>
                 </a:solidFill>
               </a:rPr>
-              <a:t>Low accident frequency</a:t>
-            </a:r>
-          </a:p>
-          <a:p>
-            <a:pPr lvl="2"/>
-            <a:r>
-              <a:rPr lang="en-US" dirty="0">
-                <a:solidFill>
-                  <a:schemeClr val="bg1"/>
-                </a:solidFill>
-              </a:rPr>
-              <a:t>Low injury severity </a:t>
-            </a:r>
-          </a:p>
-          <a:p>
-            <a:pPr lvl="2"/>
-            <a:r>
-              <a:rPr lang="en-US" dirty="0">
-                <a:solidFill>
-                  <a:schemeClr val="bg1"/>
-                </a:solidFill>
-              </a:rPr>
-              <a:t>Consistent operational safety in different types of flights</a:t>
-            </a:r>
-          </a:p>
-          <a:p>
-            <a:pPr lvl="1"/>
-            <a:r>
-              <a:rPr lang="en-US" dirty="0">
-                <a:solidFill>
-                  <a:schemeClr val="bg1"/>
-                </a:solidFill>
-              </a:rPr>
-              <a:t>Support low risk purchase of aircrafts</a:t>
-            </a:r>
-          </a:p>
-          <a:p>
-            <a:pPr lvl="1"/>
-            <a:r>
-              <a:rPr lang="en-US" dirty="0">
-                <a:solidFill>
-                  <a:schemeClr val="bg1"/>
-                </a:solidFill>
-              </a:rPr>
-              <a:t>Provide interactive dashboards for case study analysis</a:t>
-            </a:r>
-          </a:p>
-          <a:p>
-            <a:pPr lvl="1"/>
-            <a:endParaRPr lang="en-US" dirty="0">
-              <a:solidFill>
-                <a:schemeClr val="bg1"/>
-              </a:solidFill>
-            </a:endParaRPr>
-          </a:p>
-          <a:p>
-            <a:pPr marL="457200" lvl="1" indent="0">
-              <a:buNone/>
-            </a:pPr>
-            <a:r>
-              <a:rPr lang="en-US" dirty="0">
-                <a:solidFill>
-                  <a:schemeClr val="bg1"/>
-                </a:solidFill>
-              </a:rPr>
-              <a:t>I focus on patterns over time rather than isolated incidents, to identify the best aircraft models to be bought.</a:t>
+              <a:t>Wrong selection increases safety, insurance, and regulatory risk.</a:t>
             </a:r>
           </a:p>
           <a:p>
@@ -5206,56 +4009,123 @@
         </p:spPr>
         <p:txBody>
           <a:bodyPr>
-            <a:normAutofit fontScale="90000"/>
+            <a:normAutofit/>
           </a:bodyPr>
           <a:lstStyle/>
           <a:p>
             <a:pPr algn="ctr"/>
             <a:r>
               <a:rPr lang="en-US" sz="4000" b="1" dirty="0">
+                <a:solidFill>
+                  <a:schemeClr val="bg1"/>
+                </a:solidFill>
+                <a:latin typeface="Copperplate Gothic Bold" panose="020E0705020206020404" pitchFamily="34" charset="0"/>
+                <a:cs typeface="Times New Roman" panose="02020603050405020304" pitchFamily="18" charset="0"/>
+              </a:rPr>
+              <a:t>Data Foundation</a:t>
+            </a:r>
+          </a:p>
+        </p:txBody>
+      </p:sp>
+      <p:sp>
+        <p:nvSpPr>
+          <p:cNvPr id="3" name="Content Placeholder 2">
+            <a:extLst>
+              <a:ext uri="{FF2B5EF4-FFF2-40B4-BE49-F238E27FC236}">
+                <a16:creationId xmlns:a16="http://schemas.microsoft.com/office/drawing/2014/main" id="{4C5DC022-B1CA-FA68-C930-A3B96D21A8A5}"/>
+              </a:ext>
+            </a:extLst>
+          </p:cNvPr>
+          <p:cNvSpPr>
+            <a:spLocks noGrp="1"/>
+          </p:cNvSpPr>
+          <p:nvPr>
+            <p:ph idx="1"/>
+          </p:nvPr>
+        </p:nvSpPr>
+        <p:spPr>
+          <a:xfrm>
+            <a:off x="838200" y="2242457"/>
+            <a:ext cx="10515600" cy="3934506"/>
+          </a:xfrm>
+        </p:spPr>
+        <p:txBody>
+          <a:bodyPr>
+            <a:normAutofit/>
+          </a:bodyPr>
+          <a:lstStyle/>
+          <a:p>
+            <a:pPr>
+              <a:buFont typeface="Wingdings" panose="05000000000000000000" pitchFamily="2" charset="2"/>
+              <a:buChar char="ü"/>
+            </a:pPr>
+            <a:r>
+              <a:rPr lang="en-US" sz="3200" dirty="0">
                 <a:solidFill>
                   <a:schemeClr val="bg1"/>
                 </a:solidFill>
                 <a:latin typeface="Times New Roman" panose="02020603050405020304" pitchFamily="18" charset="0"/>
                 <a:cs typeface="Times New Roman" panose="02020603050405020304" pitchFamily="18" charset="0"/>
               </a:rPr>
-              <a:t>New Aviation Division: Leveraging Aviation Accident Analysis for a Safe and Successful Purchase and Operations of Commercial and Private Air Fleet.</a:t>
-            </a:r>
-          </a:p>
-        </p:txBody>
-      </p:sp>
-      <p:sp>
-        <p:nvSpPr>
-          <p:cNvPr id="3" name="Content Placeholder 2">
-            <a:extLst>
-              <a:ext uri="{FF2B5EF4-FFF2-40B4-BE49-F238E27FC236}">
-                <a16:creationId xmlns:a16="http://schemas.microsoft.com/office/drawing/2014/main" id="{4C5DC022-B1CA-FA68-C930-A3B96D21A8A5}"/>
-              </a:ext>
-            </a:extLst>
-          </p:cNvPr>
-          <p:cNvSpPr>
-            <a:spLocks noGrp="1"/>
-          </p:cNvSpPr>
-          <p:nvPr>
-            <p:ph idx="1"/>
-          </p:nvPr>
-        </p:nvSpPr>
-        <p:spPr>
-          <a:xfrm>
-            <a:off x="838200" y="2242457"/>
-            <a:ext cx="10515600" cy="3934506"/>
-          </a:xfrm>
-        </p:spPr>
-        <p:txBody>
-          <a:bodyPr>
-            <a:normAutofit lnSpcReduction="10000"/>
-          </a:bodyPr>
-          <a:lstStyle/>
+              <a:t>42 years of aviation accident data (1948,1982-2022)</a:t>
+            </a:r>
+          </a:p>
           <a:p>
             <a:pPr>
               <a:buFont typeface="Wingdings" panose="05000000000000000000" pitchFamily="2" charset="2"/>
               <a:buChar char="ü"/>
             </a:pPr>
+            <a:endParaRPr lang="en-US" sz="3200" dirty="0">
+              <a:solidFill>
+                <a:schemeClr val="bg1"/>
+              </a:solidFill>
+              <a:latin typeface="Times New Roman" panose="02020603050405020304" pitchFamily="18" charset="0"/>
+              <a:cs typeface="Times New Roman" panose="02020603050405020304" pitchFamily="18" charset="0"/>
+            </a:endParaRPr>
+          </a:p>
+          <a:p>
+            <a:pPr>
+              <a:buFont typeface="Wingdings" panose="05000000000000000000" pitchFamily="2" charset="2"/>
+              <a:buChar char="ü"/>
+            </a:pPr>
+            <a:r>
+              <a:rPr lang="en-US" sz="3200" dirty="0">
+                <a:solidFill>
+                  <a:schemeClr val="bg1"/>
+                </a:solidFill>
+                <a:latin typeface="Times New Roman" panose="02020603050405020304" pitchFamily="18" charset="0"/>
+                <a:cs typeface="Times New Roman" panose="02020603050405020304" pitchFamily="18" charset="0"/>
+              </a:rPr>
+              <a:t>Commercial and private aircrafts are featured</a:t>
+            </a:r>
+          </a:p>
+          <a:p>
+            <a:pPr marL="0" indent="0">
+              <a:buNone/>
+            </a:pPr>
+            <a:endParaRPr lang="en-US" sz="3200" dirty="0">
+              <a:solidFill>
+                <a:schemeClr val="bg1"/>
+              </a:solidFill>
+              <a:latin typeface="Times New Roman" panose="02020603050405020304" pitchFamily="18" charset="0"/>
+              <a:cs typeface="Times New Roman" panose="02020603050405020304" pitchFamily="18" charset="0"/>
+            </a:endParaRPr>
+          </a:p>
+          <a:p>
+            <a:pPr>
+              <a:buFont typeface="Wingdings" panose="05000000000000000000" pitchFamily="2" charset="2"/>
+              <a:buChar char="ü"/>
+            </a:pPr>
+            <a:r>
+              <a:rPr lang="en-US" sz="3200" dirty="0">
+                <a:solidFill>
+                  <a:schemeClr val="bg1"/>
+                </a:solidFill>
+                <a:latin typeface="Times New Roman" panose="02020603050405020304" pitchFamily="18" charset="0"/>
+                <a:cs typeface="Times New Roman" panose="02020603050405020304" pitchFamily="18" charset="0"/>
+              </a:rPr>
+              <a:t>U.S.A and international operations</a:t>
+            </a:r>
             <a:r>
               <a:rPr lang="en-US" sz="2400" dirty="0">
                 <a:solidFill>
@@ -5264,142 +4134,8 @@
                 <a:latin typeface="Times New Roman" panose="02020603050405020304" pitchFamily="18" charset="0"/>
                 <a:cs typeface="Times New Roman" panose="02020603050405020304" pitchFamily="18" charset="0"/>
               </a:rPr>
-              <a:t>Purchasing Aircrafts involves high starting capital and safety risk</a:t>
-            </a:r>
-          </a:p>
-          <a:p>
-            <a:pPr>
-              <a:buFont typeface="Wingdings" panose="05000000000000000000" pitchFamily="2" charset="2"/>
-              <a:buChar char="ü"/>
-            </a:pPr>
-            <a:r>
-              <a:rPr lang="en-US" sz="2400" dirty="0">
-                <a:solidFill>
-                  <a:schemeClr val="bg1"/>
-                </a:solidFill>
-                <a:latin typeface="Times New Roman" panose="02020603050405020304" pitchFamily="18" charset="0"/>
-                <a:cs typeface="Times New Roman" panose="02020603050405020304" pitchFamily="18" charset="0"/>
-              </a:rPr>
-              <a:t>Poor uninformed aircraft choices may lead to:   </a:t>
-            </a:r>
-          </a:p>
-          <a:p>
-            <a:pPr lvl="1"/>
-            <a:r>
-              <a:rPr lang="en-US" dirty="0">
-                <a:solidFill>
-                  <a:schemeClr val="bg1"/>
-                </a:solidFill>
-                <a:latin typeface="Times New Roman" panose="02020603050405020304" pitchFamily="18" charset="0"/>
-                <a:cs typeface="Times New Roman" panose="02020603050405020304" pitchFamily="18" charset="0"/>
-              </a:rPr>
-              <a:t>Financial loss</a:t>
-            </a:r>
-          </a:p>
-          <a:p>
-            <a:pPr lvl="1"/>
-            <a:r>
-              <a:rPr lang="en-US" dirty="0">
-                <a:solidFill>
-                  <a:schemeClr val="bg1"/>
-                </a:solidFill>
-                <a:latin typeface="Times New Roman" panose="02020603050405020304" pitchFamily="18" charset="0"/>
-                <a:cs typeface="Times New Roman" panose="02020603050405020304" pitchFamily="18" charset="0"/>
-              </a:rPr>
-              <a:t>Non-compliance with prevailing national laws for aircraft registration and operation</a:t>
-            </a:r>
-          </a:p>
-          <a:p>
-            <a:pPr lvl="1"/>
-            <a:r>
-              <a:rPr lang="en-US" dirty="0">
-                <a:solidFill>
-                  <a:schemeClr val="bg1"/>
-                </a:solidFill>
-                <a:latin typeface="Times New Roman" panose="02020603050405020304" pitchFamily="18" charset="0"/>
-                <a:cs typeface="Times New Roman" panose="02020603050405020304" pitchFamily="18" charset="0"/>
-              </a:rPr>
-              <a:t>Reputational loss</a:t>
-            </a:r>
-          </a:p>
-          <a:p>
-            <a:pPr lvl="1"/>
-            <a:r>
-              <a:rPr lang="en-US" dirty="0">
-                <a:solidFill>
-                  <a:schemeClr val="bg1"/>
-                </a:solidFill>
-                <a:latin typeface="Times New Roman" panose="02020603050405020304" pitchFamily="18" charset="0"/>
-                <a:cs typeface="Times New Roman" panose="02020603050405020304" pitchFamily="18" charset="0"/>
-              </a:rPr>
-              <a:t>Difficulty in financing and insurance</a:t>
-            </a:r>
-          </a:p>
-          <a:p>
-            <a:pPr lvl="1"/>
-            <a:r>
-              <a:rPr lang="en-US" dirty="0">
-                <a:solidFill>
-                  <a:schemeClr val="bg1"/>
-                </a:solidFill>
-                <a:latin typeface="Times New Roman" panose="02020603050405020304" pitchFamily="18" charset="0"/>
-                <a:cs typeface="Times New Roman" panose="02020603050405020304" pitchFamily="18" charset="0"/>
-              </a:rPr>
-              <a:t>Unexpected operating costs.</a:t>
-            </a:r>
-          </a:p>
-          <a:p>
-            <a:pPr>
-              <a:buFont typeface="Wingdings" panose="05000000000000000000" pitchFamily="2" charset="2"/>
-              <a:buChar char="ü"/>
-            </a:pPr>
-            <a:r>
-              <a:rPr lang="en-US" sz="2400" dirty="0">
-                <a:solidFill>
-                  <a:schemeClr val="bg1"/>
-                </a:solidFill>
-                <a:latin typeface="Times New Roman" panose="02020603050405020304" pitchFamily="18" charset="0"/>
-                <a:cs typeface="Times New Roman" panose="02020603050405020304" pitchFamily="18" charset="0"/>
-              </a:rPr>
-              <a:t>The New Aviation Division require evidence based guidance not assumptions</a:t>
-            </a:r>
-            <a:r>
-              <a:rPr lang="en-US" sz="1200" dirty="0">
-                <a:solidFill>
-                  <a:schemeClr val="bg1"/>
-                </a:solidFill>
-                <a:latin typeface="Times New Roman" panose="02020603050405020304" pitchFamily="18" charset="0"/>
-                <a:cs typeface="Times New Roman" panose="02020603050405020304" pitchFamily="18" charset="0"/>
-              </a:rPr>
               <a:t>.</a:t>
             </a:r>
-            <a:r>
-              <a:rPr lang="en-US" sz="2400" dirty="0">
-                <a:solidFill>
-                  <a:schemeClr val="bg1"/>
-                </a:solidFill>
-                <a:latin typeface="Times New Roman" panose="02020603050405020304" pitchFamily="18" charset="0"/>
-                <a:cs typeface="Times New Roman" panose="02020603050405020304" pitchFamily="18" charset="0"/>
-              </a:rPr>
-              <a:t>, to be able to minimize risk when purchasing new aircrafts</a:t>
-            </a:r>
-            <a:r>
-              <a:rPr lang="en-US" sz="1600" dirty="0">
-                <a:solidFill>
-                  <a:schemeClr val="bg1"/>
-                </a:solidFill>
-                <a:latin typeface="Times New Roman" panose="02020603050405020304" pitchFamily="18" charset="0"/>
-                <a:cs typeface="Times New Roman" panose="02020603050405020304" pitchFamily="18" charset="0"/>
-              </a:rPr>
-              <a:t>.</a:t>
-            </a:r>
-            <a:endParaRPr lang="en-US" sz="2400" dirty="0">
-              <a:solidFill>
-                <a:schemeClr val="bg1"/>
-              </a:solidFill>
-              <a:latin typeface="Times New Roman" panose="02020603050405020304" pitchFamily="18" charset="0"/>
-              <a:cs typeface="Times New Roman" panose="02020603050405020304" pitchFamily="18" charset="0"/>
-            </a:endParaRPr>
           </a:p>
         </p:txBody>
       </p:sp>
@@ -5485,7 +4221,7 @@
           <p:cNvPr id="2" name="Title 1">
             <a:extLst>
               <a:ext uri="{FF2B5EF4-FFF2-40B4-BE49-F238E27FC236}">
-                <a16:creationId xmlns:a16="http://schemas.microsoft.com/office/drawing/2014/main" id="{4026E5EE-9992-C061-40E6-7F3772314F3F}"/>
+                <a16:creationId xmlns:a16="http://schemas.microsoft.com/office/drawing/2014/main" id="{087F2B1F-083A-DC9E-515C-A104B0693229}"/>
               </a:ext>
             </a:extLst>
           </p:cNvPr>
@@ -5496,167 +4232,164 @@
             <p:ph type="title"/>
           </p:nvPr>
         </p:nvSpPr>
-        <p:spPr/>
-        <p:txBody>
-          <a:bodyPr/>
+        <p:spPr>
+          <a:xfrm>
+            <a:off x="838200" y="1"/>
+            <a:ext cx="9873343" cy="947056"/>
+          </a:xfrm>
+        </p:spPr>
+        <p:txBody>
+          <a:bodyPr>
+            <a:normAutofit fontScale="90000"/>
+          </a:bodyPr>
           <a:lstStyle/>
           <a:p>
             <a:pPr algn="ctr"/>
             <a:r>
-              <a:rPr lang="en-US" dirty="0" err="1">
+              <a:rPr lang="en-US" dirty="0">
+                <a:solidFill>
+                  <a:schemeClr val="bg1"/>
+                </a:solidFill>
+                <a:latin typeface="Copperplate Gothic Bold" panose="020E0705020206020404" pitchFamily="34" charset="0"/>
+              </a:rPr>
+              <a:t>Accidents Safety Trends Over Time</a:t>
+            </a:r>
+          </a:p>
+        </p:txBody>
+      </p:sp>
+      <p:pic>
+        <p:nvPicPr>
+          <p:cNvPr id="5" name="Content Placeholder 4">
+            <a:extLst>
+              <a:ext uri="{FF2B5EF4-FFF2-40B4-BE49-F238E27FC236}">
+                <a16:creationId xmlns:a16="http://schemas.microsoft.com/office/drawing/2014/main" id="{F5260797-D547-267B-AB3F-148D4F2431A4}"/>
+              </a:ext>
+            </a:extLst>
+          </p:cNvPr>
+          <p:cNvPicPr>
+            <a:picLocks noGrp="1" noChangeAspect="1"/>
+          </p:cNvPicPr>
+          <p:nvPr>
+            <p:ph idx="1"/>
+          </p:nvPr>
+        </p:nvPicPr>
+        <p:blipFill>
+          <a:blip r:embed="rId2">
+            <a:extLst>
+              <a:ext uri="{28A0092B-C50C-407E-A947-70E740481C1C}">
+                <a14:useLocalDpi xmlns:a14="http://schemas.microsoft.com/office/drawing/2010/main" val="0"/>
+              </a:ext>
+            </a:extLst>
+          </a:blip>
+          <a:stretch>
+            <a:fillRect/>
+          </a:stretch>
+        </p:blipFill>
+        <p:spPr>
+          <a:xfrm>
+            <a:off x="0" y="947057"/>
+            <a:ext cx="6966857" cy="5910943"/>
+          </a:xfrm>
+        </p:spPr>
+      </p:pic>
+      <p:sp>
+        <p:nvSpPr>
+          <p:cNvPr id="7" name="TextBox 6">
+            <a:extLst>
+              <a:ext uri="{FF2B5EF4-FFF2-40B4-BE49-F238E27FC236}">
+                <a16:creationId xmlns:a16="http://schemas.microsoft.com/office/drawing/2014/main" id="{6EEA19C7-3355-C7B8-EE35-2DA818966BBC}"/>
+              </a:ext>
+            </a:extLst>
+          </p:cNvPr>
+          <p:cNvSpPr txBox="1"/>
+          <p:nvPr/>
+        </p:nvSpPr>
+        <p:spPr>
+          <a:xfrm>
+            <a:off x="6966857" y="468086"/>
+            <a:ext cx="5225143" cy="4031873"/>
+          </a:xfrm>
+          <a:prstGeom prst="rect">
+            <a:avLst/>
+          </a:prstGeom>
+          <a:noFill/>
+        </p:spPr>
+        <p:txBody>
+          <a:bodyPr wrap="square" rtlCol="0">
+            <a:spAutoFit/>
+          </a:bodyPr>
+          <a:lstStyle/>
+          <a:p>
+            <a:endParaRPr lang="en-US" sz="3200" dirty="0">
+              <a:solidFill>
+                <a:schemeClr val="bg1"/>
+              </a:solidFill>
+            </a:endParaRPr>
+          </a:p>
+          <a:p>
+            <a:pPr marL="342900" indent="-342900">
+              <a:buFont typeface="Arial" panose="020B0604020202020204" pitchFamily="34" charset="0"/>
+              <a:buChar char="•"/>
+            </a:pPr>
+            <a:r>
+              <a:rPr lang="en-US" sz="3200" dirty="0">
                 <a:solidFill>
                   <a:schemeClr val="bg1"/>
                 </a:solidFill>
               </a:rPr>
-              <a:t>AviationData_csv</a:t>
-            </a:r>
-            <a:endParaRPr lang="en-US" dirty="0">
+              <a:t> Overall aviation safety has improved over time.</a:t>
+            </a:r>
+          </a:p>
+          <a:p>
+            <a:endParaRPr lang="en-US" sz="3200" dirty="0">
               <a:solidFill>
                 <a:schemeClr val="bg1"/>
               </a:solidFill>
             </a:endParaRPr>
           </a:p>
-        </p:txBody>
-      </p:sp>
-      <p:sp>
-        <p:nvSpPr>
-          <p:cNvPr id="3" name="Content Placeholder 2">
-            <a:extLst>
-              <a:ext uri="{FF2B5EF4-FFF2-40B4-BE49-F238E27FC236}">
-                <a16:creationId xmlns:a16="http://schemas.microsoft.com/office/drawing/2014/main" id="{5D195C9F-63D7-2D75-6EE0-99CA6F0A923B}"/>
-              </a:ext>
-            </a:extLst>
-          </p:cNvPr>
-          <p:cNvSpPr>
-            <a:spLocks noGrp="1"/>
-          </p:cNvSpPr>
-          <p:nvPr>
-            <p:ph idx="1"/>
-          </p:nvPr>
-        </p:nvSpPr>
-        <p:spPr/>
-        <p:txBody>
-          <a:bodyPr>
-            <a:normAutofit/>
-          </a:bodyPr>
-          <a:lstStyle/>
-          <a:p>
-            <a:pPr marL="0" indent="0" algn="ctr">
-              <a:buNone/>
+          <a:p>
+            <a:endParaRPr lang="en-US" sz="3200" dirty="0">
+              <a:solidFill>
+                <a:schemeClr val="bg1"/>
+              </a:solidFill>
+            </a:endParaRPr>
+          </a:p>
+          <a:p>
+            <a:pPr marL="342900" indent="-342900">
+              <a:buFont typeface="Arial" panose="020B0604020202020204" pitchFamily="34" charset="0"/>
+              <a:buChar char="•"/>
             </a:pPr>
             <a:r>
-              <a:rPr lang="en-US" dirty="0">
+              <a:rPr lang="en-US" sz="3200" dirty="0">
                 <a:solidFill>
                   <a:schemeClr val="bg1"/>
                 </a:solidFill>
               </a:rPr>
-              <a:t>Contents of the </a:t>
-            </a:r>
-            <a:r>
-              <a:rPr lang="en-US" dirty="0" err="1">
+              <a:t>Modern aircraft operate under stronger safety </a:t>
+            </a:r>
+            <a:r>
+              <a:rPr lang="en-US" sz="3200" dirty="0" err="1">
                 <a:solidFill>
                   <a:schemeClr val="bg1"/>
                 </a:solidFill>
               </a:rPr>
-              <a:t>AviationData</a:t>
-            </a:r>
-            <a:r>
-              <a:rPr lang="en-US" dirty="0">
+              <a:t>standars</a:t>
+            </a:r>
+            <a:r>
+              <a:rPr lang="en-US" sz="3200" dirty="0">
                 <a:solidFill>
                   <a:schemeClr val="bg1"/>
                 </a:solidFill>
               </a:rPr>
-              <a:t> used:</a:t>
-            </a:r>
-          </a:p>
-          <a:p>
-            <a:r>
-              <a:rPr lang="en-US" dirty="0">
-                <a:solidFill>
-                  <a:schemeClr val="bg1"/>
-                </a:solidFill>
-              </a:rPr>
-              <a:t>Civil aviation accident records</a:t>
-            </a:r>
-          </a:p>
-          <a:p>
-            <a:r>
-              <a:rPr lang="en-US" dirty="0">
-                <a:solidFill>
-                  <a:schemeClr val="bg1"/>
-                </a:solidFill>
-              </a:rPr>
-              <a:t>Between 1962-2023 and 1948</a:t>
-            </a:r>
-          </a:p>
-          <a:p>
-            <a:r>
-              <a:rPr lang="en-US" dirty="0">
-                <a:solidFill>
-                  <a:schemeClr val="bg1"/>
-                </a:solidFill>
-              </a:rPr>
-              <a:t>Coverage: </a:t>
-            </a:r>
-          </a:p>
-          <a:p>
-            <a:pPr lvl="1"/>
-            <a:r>
-              <a:rPr lang="en-US" dirty="0">
-                <a:solidFill>
-                  <a:schemeClr val="bg1"/>
-                </a:solidFill>
-              </a:rPr>
-              <a:t>U.S.A AND International waters</a:t>
-            </a:r>
-          </a:p>
-          <a:p>
-            <a:pPr lvl="1"/>
-            <a:r>
-              <a:rPr lang="en-US" dirty="0">
-                <a:solidFill>
-                  <a:schemeClr val="bg1"/>
-                </a:solidFill>
-              </a:rPr>
-              <a:t>Commercial and private aircraft</a:t>
-            </a:r>
-          </a:p>
-          <a:p>
-            <a:r>
-              <a:rPr lang="en-US" dirty="0">
-                <a:solidFill>
-                  <a:schemeClr val="bg1"/>
-                </a:solidFill>
-              </a:rPr>
-              <a:t>Each record represents one reported aviation accident</a:t>
-            </a:r>
-          </a:p>
-          <a:p>
-            <a:pPr marL="0" indent="0">
-              <a:buNone/>
-            </a:pPr>
-            <a:r>
-              <a:rPr lang="en-US" dirty="0">
-                <a:solidFill>
-                  <a:schemeClr val="bg1"/>
-                </a:solidFill>
-              </a:rPr>
-              <a:t>This dataset allows me to evaluate long term safety trends across aircraft models.</a:t>
-            </a:r>
-          </a:p>
-          <a:p>
-            <a:endParaRPr lang="en-US" dirty="0">
-              <a:solidFill>
-                <a:schemeClr val="bg1"/>
-              </a:solidFill>
-            </a:endParaRPr>
+              <a:t>.</a:t>
+            </a:r>
           </a:p>
         </p:txBody>
       </p:sp>
     </p:spTree>
     <p:extLst>
       <p:ext uri="{BB962C8B-B14F-4D97-AF65-F5344CB8AC3E}">
-        <p14:creationId xmlns:p14="http://schemas.microsoft.com/office/powerpoint/2010/main" val="3761813301"/>
+        <p14:creationId xmlns:p14="http://schemas.microsoft.com/office/powerpoint/2010/main" val="1590567606"/>
       </p:ext>
     </p:extLst>
   </p:cSld>
@@ -5688,7 +4421,7 @@
           <p:cNvPr id="2" name="Title 1">
             <a:extLst>
               <a:ext uri="{FF2B5EF4-FFF2-40B4-BE49-F238E27FC236}">
-                <a16:creationId xmlns:a16="http://schemas.microsoft.com/office/drawing/2014/main" id="{D39083EC-BF25-C40B-69DC-66DA2BBA1F20}"/>
+                <a16:creationId xmlns:a16="http://schemas.microsoft.com/office/drawing/2014/main" id="{F4F0761C-CD8D-A9A7-431C-352DF8330C5A}"/>
               </a:ext>
             </a:extLst>
           </p:cNvPr>
@@ -5699,141 +4432,126 @@
             <p:ph type="title"/>
           </p:nvPr>
         </p:nvSpPr>
-        <p:spPr/>
-        <p:txBody>
-          <a:bodyPr/>
-          <a:lstStyle/>
-          <a:p>
-            <a:r>
-              <a:rPr lang="en-US" dirty="0">
+        <p:spPr>
+          <a:xfrm>
+            <a:off x="481101" y="0"/>
+            <a:ext cx="10823713" cy="1110344"/>
+          </a:xfrm>
+        </p:spPr>
+        <p:txBody>
+          <a:bodyPr>
+            <a:normAutofit fontScale="90000"/>
+          </a:bodyPr>
+          <a:lstStyle/>
+          <a:p>
+            <a:pPr algn="ctr"/>
+            <a:r>
+              <a:rPr lang="en-US" b="1" dirty="0">
+                <a:solidFill>
+                  <a:schemeClr val="bg1"/>
+                </a:solidFill>
+                <a:latin typeface="Copperplate Gothic Bold" panose="020E0705020206020404" pitchFamily="34" charset="0"/>
+              </a:rPr>
+              <a:t>Accident Frequency by Aircraft Model</a:t>
+            </a:r>
+          </a:p>
+        </p:txBody>
+      </p:sp>
+      <p:pic>
+        <p:nvPicPr>
+          <p:cNvPr id="5" name="Content Placeholder 4">
+            <a:extLst>
+              <a:ext uri="{FF2B5EF4-FFF2-40B4-BE49-F238E27FC236}">
+                <a16:creationId xmlns:a16="http://schemas.microsoft.com/office/drawing/2014/main" id="{0BF0C845-A7FB-DD8C-35EE-5D978BF5D00F}"/>
+              </a:ext>
+            </a:extLst>
+          </p:cNvPr>
+          <p:cNvPicPr>
+            <a:picLocks noGrp="1" noChangeAspect="1"/>
+          </p:cNvPicPr>
+          <p:nvPr>
+            <p:ph idx="1"/>
+          </p:nvPr>
+        </p:nvPicPr>
+        <p:blipFill>
+          <a:blip r:embed="rId2">
+            <a:extLst>
+              <a:ext uri="{28A0092B-C50C-407E-A947-70E740481C1C}">
+                <a14:useLocalDpi xmlns:a14="http://schemas.microsoft.com/office/drawing/2010/main" val="0"/>
+              </a:ext>
+            </a:extLst>
+          </a:blip>
+          <a:stretch>
+            <a:fillRect/>
+          </a:stretch>
+        </p:blipFill>
+        <p:spPr>
+          <a:xfrm>
+            <a:off x="0" y="1110344"/>
+            <a:ext cx="8311243" cy="5747656"/>
+          </a:xfrm>
+        </p:spPr>
+      </p:pic>
+      <p:sp>
+        <p:nvSpPr>
+          <p:cNvPr id="6" name="TextBox 5">
+            <a:extLst>
+              <a:ext uri="{FF2B5EF4-FFF2-40B4-BE49-F238E27FC236}">
+                <a16:creationId xmlns:a16="http://schemas.microsoft.com/office/drawing/2014/main" id="{E40A62A9-5D62-9ACB-D230-62CA8D268227}"/>
+              </a:ext>
+            </a:extLst>
+          </p:cNvPr>
+          <p:cNvSpPr txBox="1"/>
+          <p:nvPr/>
+        </p:nvSpPr>
+        <p:spPr>
+          <a:xfrm>
+            <a:off x="8311243" y="1266766"/>
+            <a:ext cx="3880757" cy="3539430"/>
+          </a:xfrm>
+          <a:prstGeom prst="rect">
+            <a:avLst/>
+          </a:prstGeom>
+          <a:noFill/>
+        </p:spPr>
+        <p:txBody>
+          <a:bodyPr wrap="square" rtlCol="0">
+            <a:spAutoFit/>
+          </a:bodyPr>
+          <a:lstStyle/>
+          <a:p>
+            <a:pPr marL="342900" indent="-342900">
+              <a:buFont typeface="Arial" panose="020B0604020202020204" pitchFamily="34" charset="0"/>
+              <a:buChar char="•"/>
+            </a:pPr>
+            <a:r>
+              <a:rPr lang="en-US" sz="3200" b="1" dirty="0">
                 <a:solidFill>
                   <a:schemeClr val="bg1"/>
                 </a:solidFill>
               </a:rPr>
-              <a:t>Data Manipulation(preparation)</a:t>
-            </a:r>
-          </a:p>
-        </p:txBody>
-      </p:sp>
-      <p:sp>
-        <p:nvSpPr>
-          <p:cNvPr id="3" name="Content Placeholder 2">
-            <a:extLst>
-              <a:ext uri="{FF2B5EF4-FFF2-40B4-BE49-F238E27FC236}">
-                <a16:creationId xmlns:a16="http://schemas.microsoft.com/office/drawing/2014/main" id="{C890F23A-D189-7F38-3273-9E1994448C69}"/>
-              </a:ext>
-            </a:extLst>
-          </p:cNvPr>
-          <p:cNvSpPr>
-            <a:spLocks noGrp="1"/>
-          </p:cNvSpPr>
-          <p:nvPr>
-            <p:ph idx="1"/>
-          </p:nvPr>
-        </p:nvSpPr>
-        <p:spPr/>
-        <p:txBody>
-          <a:bodyPr>
-            <a:normAutofit lnSpcReduction="10000"/>
-          </a:bodyPr>
-          <a:lstStyle/>
-          <a:p>
-            <a:pPr marL="0" indent="0">
-              <a:buNone/>
+              <a:t>High accident counts often reflect higher usage.</a:t>
+            </a:r>
+          </a:p>
+          <a:p>
+            <a:endParaRPr lang="en-US" sz="3200" b="1" dirty="0">
+              <a:solidFill>
+                <a:schemeClr val="bg1"/>
+              </a:solidFill>
+            </a:endParaRPr>
+          </a:p>
+          <a:p>
+            <a:pPr marL="342900" indent="-342900">
+              <a:buFont typeface="Arial" panose="020B0604020202020204" pitchFamily="34" charset="0"/>
+              <a:buChar char="•"/>
             </a:pPr>
             <a:r>
-              <a:rPr lang="en-US" b="1" dirty="0">
+              <a:rPr lang="en-US" sz="3200" b="1" dirty="0">
                 <a:solidFill>
                   <a:schemeClr val="bg1"/>
                 </a:solidFill>
               </a:rPr>
-              <a:t>How the data was prepared:</a:t>
-            </a:r>
-          </a:p>
-          <a:p>
-            <a:r>
-              <a:rPr lang="en-US" b="1" dirty="0">
-                <a:solidFill>
-                  <a:schemeClr val="bg1"/>
-                </a:solidFill>
-              </a:rPr>
-              <a:t>Remove incomplete or irrelevant fields</a:t>
-            </a:r>
-          </a:p>
-          <a:p>
-            <a:r>
-              <a:rPr lang="en-US" b="1" dirty="0">
-                <a:solidFill>
-                  <a:schemeClr val="bg1"/>
-                </a:solidFill>
-              </a:rPr>
-              <a:t>Standardized column names</a:t>
-            </a:r>
-          </a:p>
-          <a:p>
-            <a:r>
-              <a:rPr lang="en-US" b="1" dirty="0">
-                <a:solidFill>
-                  <a:schemeClr val="bg1"/>
-                </a:solidFill>
-              </a:rPr>
-              <a:t>Converted date for trend analysis</a:t>
-            </a:r>
-          </a:p>
-          <a:p>
-            <a:r>
-              <a:rPr lang="en-US" b="1" dirty="0">
-                <a:solidFill>
-                  <a:schemeClr val="bg1"/>
-                </a:solidFill>
-              </a:rPr>
-              <a:t>Created safety indicators:</a:t>
-            </a:r>
-          </a:p>
-          <a:p>
-            <a:pPr lvl="1"/>
-            <a:r>
-              <a:rPr lang="en-US" b="1" dirty="0">
-                <a:solidFill>
-                  <a:schemeClr val="bg1"/>
-                </a:solidFill>
-              </a:rPr>
-              <a:t>Accident frequency per year</a:t>
-            </a:r>
-          </a:p>
-          <a:p>
-            <a:pPr lvl="1"/>
-            <a:r>
-              <a:rPr lang="en-US" b="1" dirty="0">
-                <a:solidFill>
-                  <a:schemeClr val="bg1"/>
-                </a:solidFill>
-              </a:rPr>
-              <a:t>Fatality rate</a:t>
-            </a:r>
-          </a:p>
-          <a:p>
-            <a:pPr lvl="1"/>
-            <a:r>
-              <a:rPr lang="en-US" b="1" dirty="0">
-                <a:solidFill>
-                  <a:schemeClr val="bg1"/>
-                </a:solidFill>
-              </a:rPr>
-              <a:t>Severity rate</a:t>
-            </a:r>
-          </a:p>
-          <a:p>
-            <a:pPr marL="0" indent="0">
-              <a:buNone/>
-            </a:pPr>
-            <a:r>
-              <a:rPr lang="en-US" b="1" dirty="0">
-                <a:solidFill>
-                  <a:schemeClr val="bg1"/>
-                </a:solidFill>
-              </a:rPr>
-              <a:t>The safety indicators ensures results are reliable and comparable across aircraft models.</a:t>
+              <a:t>Frequency alone does not show higher risk</a:t>
             </a:r>
           </a:p>
         </p:txBody>
@@ -5841,7 +4559,7 @@
     </p:spTree>
     <p:extLst>
       <p:ext uri="{BB962C8B-B14F-4D97-AF65-F5344CB8AC3E}">
-        <p14:creationId xmlns:p14="http://schemas.microsoft.com/office/powerpoint/2010/main" val="937670051"/>
+        <p14:creationId xmlns:p14="http://schemas.microsoft.com/office/powerpoint/2010/main" val="1110746125"/>
       </p:ext>
     </p:extLst>
   </p:cSld>
@@ -5873,7 +4591,7 @@
           <p:cNvPr id="2" name="Title 1">
             <a:extLst>
               <a:ext uri="{FF2B5EF4-FFF2-40B4-BE49-F238E27FC236}">
-                <a16:creationId xmlns:a16="http://schemas.microsoft.com/office/drawing/2014/main" id="{087F2B1F-083A-DC9E-515C-A104B0693229}"/>
+                <a16:creationId xmlns:a16="http://schemas.microsoft.com/office/drawing/2014/main" id="{AD68A511-9064-4621-12A8-566C9D5CC6F3}"/>
               </a:ext>
             </a:extLst>
           </p:cNvPr>
@@ -5886,24 +4604,25 @@
         </p:nvSpPr>
         <p:spPr>
           <a:xfrm>
-            <a:off x="838200" y="145776"/>
-            <a:ext cx="9046029" cy="235224"/>
+            <a:off x="130629" y="0"/>
+            <a:ext cx="12061371" cy="881743"/>
           </a:xfrm>
         </p:spPr>
         <p:txBody>
           <a:bodyPr>
-            <a:normAutofit fontScale="90000"/>
+            <a:noAutofit/>
           </a:bodyPr>
           <a:lstStyle/>
           <a:p>
             <a:pPr algn="ctr"/>
             <a:r>
-              <a:rPr lang="en-US" dirty="0">
+              <a:rPr lang="en-US" sz="3600" b="1" dirty="0">
                 <a:solidFill>
                   <a:schemeClr val="bg1"/>
                 </a:solidFill>
+                <a:latin typeface="Copperplate Gothic Bold" panose="020E0705020206020404" pitchFamily="34" charset="0"/>
               </a:rPr>
-              <a:t>Accidents Trends Over Time</a:t>
+              <a:t>Injury Severity Matters More than Frequency of Accidents</a:t>
             </a:r>
           </a:p>
         </p:txBody>
@@ -5913,7 +4632,7 @@
           <p:cNvPr id="5" name="Content Placeholder 4">
             <a:extLst>
               <a:ext uri="{FF2B5EF4-FFF2-40B4-BE49-F238E27FC236}">
-                <a16:creationId xmlns:a16="http://schemas.microsoft.com/office/drawing/2014/main" id="{F5260797-D547-267B-AB3F-148D4F2431A4}"/>
+                <a16:creationId xmlns:a16="http://schemas.microsoft.com/office/drawing/2014/main" id="{64E43892-AE6B-8E7C-5F06-3C2000ACD5D2}"/>
               </a:ext>
             </a:extLst>
           </p:cNvPr>
@@ -5938,8 +4657,8 @@
         </p:blipFill>
         <p:spPr>
           <a:xfrm>
-            <a:off x="0" y="555171"/>
-            <a:ext cx="6966857" cy="6302829"/>
+            <a:off x="0" y="881744"/>
+            <a:ext cx="8490857" cy="5976256"/>
           </a:xfrm>
         </p:spPr>
       </p:pic>
@@ -5948,7 +4667,7 @@
           <p:cNvPr id="7" name="TextBox 6">
             <a:extLst>
               <a:ext uri="{FF2B5EF4-FFF2-40B4-BE49-F238E27FC236}">
-                <a16:creationId xmlns:a16="http://schemas.microsoft.com/office/drawing/2014/main" id="{6EEA19C7-3355-C7B8-EE35-2DA818966BBC}"/>
+                <a16:creationId xmlns:a16="http://schemas.microsoft.com/office/drawing/2014/main" id="{9E188519-F2BC-ACBF-7136-6D247D9C7440}"/>
               </a:ext>
             </a:extLst>
           </p:cNvPr>
@@ -5957,8 +4676,8 @@
         </p:nvSpPr>
         <p:spPr>
           <a:xfrm>
-            <a:off x="6966857" y="468086"/>
-            <a:ext cx="5225143" cy="4154984"/>
+            <a:off x="8490857" y="881744"/>
+            <a:ext cx="3701143" cy="5509200"/>
           </a:xfrm>
           <a:prstGeom prst="rect">
             <a:avLst/>
@@ -5972,13 +4691,28 @@
           <a:lstStyle/>
           <a:p>
             <a:r>
+              <a:rPr lang="en-US" sz="3200" b="1" dirty="0">
+                <a:solidFill>
+                  <a:schemeClr val="accent2"/>
+                </a:solidFill>
+              </a:rPr>
+              <a:t>Why injury Severity </a:t>
+            </a:r>
+            <a:r>
               <a:rPr lang="en-US" sz="3200" dirty="0">
                 <a:solidFill>
                   <a:schemeClr val="bg1"/>
                 </a:solidFill>
               </a:rPr>
-              <a:t>Key Observations: Accident Trends</a:t>
-            </a:r>
+              <a:t>Matters:</a:t>
+            </a:r>
+          </a:p>
+          <a:p>
+            <a:endParaRPr lang="en-US" sz="3200" dirty="0">
+              <a:solidFill>
+                <a:schemeClr val="bg1"/>
+              </a:solidFill>
+            </a:endParaRPr>
           </a:p>
           <a:p>
             <a:pPr marL="457200" indent="-457200">
@@ -5986,13 +4720,20 @@
               <a:buChar char="•"/>
             </a:pPr>
             <a:r>
-              <a:rPr lang="en-US" sz="2000" dirty="0">
+              <a:rPr lang="en-US" sz="3200" dirty="0">
                 <a:solidFill>
                   <a:schemeClr val="bg1"/>
                 </a:solidFill>
               </a:rPr>
-              <a:t>Accident reporting increased significantly after 1980</a:t>
-            </a:r>
+              <a:t>Severity determines human and financial impact.</a:t>
+            </a:r>
+          </a:p>
+          <a:p>
+            <a:endParaRPr lang="en-US" sz="3200" dirty="0">
+              <a:solidFill>
+                <a:schemeClr val="bg1"/>
+              </a:solidFill>
+            </a:endParaRPr>
           </a:p>
           <a:p>
             <a:pPr marL="457200" indent="-457200">
@@ -6000,102 +4741,12 @@
               <a:buChar char="•"/>
             </a:pPr>
             <a:r>
-              <a:rPr lang="en-US" sz="2000" dirty="0">
+              <a:rPr lang="en-US" sz="3200" dirty="0">
                 <a:solidFill>
                   <a:schemeClr val="bg1"/>
                 </a:solidFill>
               </a:rPr>
-              <a:t>Overall trends shows:</a:t>
-            </a:r>
-          </a:p>
-          <a:p>
-            <a:pPr marL="914400" lvl="1" indent="-457200">
-              <a:buFont typeface="Arial" panose="020B0604020202020204" pitchFamily="34" charset="0"/>
-              <a:buChar char="•"/>
-            </a:pPr>
-            <a:r>
-              <a:rPr lang="en-US" sz="2000" dirty="0">
-                <a:solidFill>
-                  <a:schemeClr val="bg1"/>
-                </a:solidFill>
-              </a:rPr>
-              <a:t>Improved safety standards</a:t>
-            </a:r>
-          </a:p>
-          <a:p>
-            <a:pPr marL="914400" lvl="1" indent="-457200">
-              <a:buFont typeface="Arial" panose="020B0604020202020204" pitchFamily="34" charset="0"/>
-              <a:buChar char="•"/>
-            </a:pPr>
-            <a:r>
-              <a:rPr lang="en-US" sz="2000" dirty="0">
-                <a:solidFill>
-                  <a:schemeClr val="bg1"/>
-                </a:solidFill>
-              </a:rPr>
-              <a:t>Better reporting practices</a:t>
-            </a:r>
-          </a:p>
-          <a:p>
-            <a:pPr marL="457200" indent="-457200">
-              <a:buFont typeface="Arial" panose="020B0604020202020204" pitchFamily="34" charset="0"/>
-              <a:buChar char="•"/>
-            </a:pPr>
-            <a:r>
-              <a:rPr lang="en-US" sz="2000" dirty="0">
-                <a:solidFill>
-                  <a:schemeClr val="bg1"/>
-                </a:solidFill>
-              </a:rPr>
-              <a:t>Modern aviation operates under </a:t>
-            </a:r>
-            <a:r>
-              <a:rPr lang="en-US" sz="2000" dirty="0" err="1">
-                <a:solidFill>
-                  <a:schemeClr val="bg1"/>
-                </a:solidFill>
-              </a:rPr>
-              <a:t>strictier</a:t>
-            </a:r>
-            <a:r>
-              <a:rPr lang="en-US" sz="2000" dirty="0">
-                <a:solidFill>
-                  <a:schemeClr val="bg1"/>
-                </a:solidFill>
-              </a:rPr>
-              <a:t> safety controls</a:t>
-            </a:r>
-          </a:p>
-          <a:p>
-            <a:pPr marL="457200" indent="-457200">
-              <a:buFont typeface="Arial" panose="020B0604020202020204" pitchFamily="34" charset="0"/>
-              <a:buChar char="•"/>
-            </a:pPr>
-            <a:endParaRPr lang="en-US" sz="2000" dirty="0">
-              <a:solidFill>
-                <a:schemeClr val="bg1"/>
-              </a:solidFill>
-            </a:endParaRPr>
-          </a:p>
-          <a:p>
-            <a:pPr marL="457200" indent="-457200">
-              <a:buFont typeface="Arial" panose="020B0604020202020204" pitchFamily="34" charset="0"/>
-              <a:buChar char="•"/>
-            </a:pPr>
-            <a:endParaRPr lang="en-US" sz="2000" dirty="0">
-              <a:solidFill>
-                <a:schemeClr val="bg1"/>
-              </a:solidFill>
-            </a:endParaRPr>
-          </a:p>
-          <a:p>
-            <a:r>
-              <a:rPr lang="en-US" sz="2000" dirty="0">
-                <a:solidFill>
-                  <a:schemeClr val="bg1"/>
-                </a:solidFill>
-              </a:rPr>
-              <a:t>Here I have interpreted the historical risk</a:t>
+              <a:t>Low risk aircrafts minimizes severe outcomes.</a:t>
             </a:r>
           </a:p>
         </p:txBody>
@@ -6103,7 +4754,7 @@
     </p:spTree>
     <p:extLst>
       <p:ext uri="{BB962C8B-B14F-4D97-AF65-F5344CB8AC3E}">
-        <p14:creationId xmlns:p14="http://schemas.microsoft.com/office/powerpoint/2010/main" val="1590567606"/>
+        <p14:creationId xmlns:p14="http://schemas.microsoft.com/office/powerpoint/2010/main" val="1477361159"/>
       </p:ext>
     </p:extLst>
   </p:cSld>
@@ -6135,7 +4786,7 @@
           <p:cNvPr id="2" name="Title 1">
             <a:extLst>
               <a:ext uri="{FF2B5EF4-FFF2-40B4-BE49-F238E27FC236}">
-                <a16:creationId xmlns:a16="http://schemas.microsoft.com/office/drawing/2014/main" id="{F4F0761C-CD8D-A9A7-431C-352DF8330C5A}"/>
+                <a16:creationId xmlns:a16="http://schemas.microsoft.com/office/drawing/2014/main" id="{16945EED-6FF9-32A6-13DA-19F35A09EE0E}"/>
               </a:ext>
             </a:extLst>
           </p:cNvPr>
@@ -6148,8 +4799,8 @@
         </p:nvSpPr>
         <p:spPr>
           <a:xfrm>
-            <a:off x="530087" y="0"/>
-            <a:ext cx="10823713" cy="662609"/>
+            <a:off x="0" y="0"/>
+            <a:ext cx="12115800" cy="566057"/>
           </a:xfrm>
         </p:spPr>
         <p:txBody>
@@ -6164,8 +4815,9 @@
                 <a:solidFill>
                   <a:schemeClr val="bg1"/>
                 </a:solidFill>
+                <a:latin typeface="Copperplate Gothic Bold" panose="020E0705020206020404" pitchFamily="34" charset="0"/>
               </a:rPr>
-              <a:t>Accident Frequency by Aircraft Model</a:t>
+              <a:t>Identified Low Risk Aircrafts Models</a:t>
             </a:r>
           </a:p>
         </p:txBody>
@@ -6175,7 +4827,7 @@
           <p:cNvPr id="5" name="Content Placeholder 4">
             <a:extLst>
               <a:ext uri="{FF2B5EF4-FFF2-40B4-BE49-F238E27FC236}">
-                <a16:creationId xmlns:a16="http://schemas.microsoft.com/office/drawing/2014/main" id="{0BF0C845-A7FB-DD8C-35EE-5D978BF5D00F}"/>
+                <a16:creationId xmlns:a16="http://schemas.microsoft.com/office/drawing/2014/main" id="{138E8C60-CAA4-E62E-6738-77E2075DC132}"/>
               </a:ext>
             </a:extLst>
           </p:cNvPr>
@@ -6200,8 +4852,8 @@
         </p:blipFill>
         <p:spPr>
           <a:xfrm>
-            <a:off x="0" y="522514"/>
-            <a:ext cx="7836535" cy="6335485"/>
+            <a:off x="1" y="468086"/>
+            <a:ext cx="7805056" cy="6389913"/>
           </a:xfrm>
         </p:spPr>
       </p:pic>
@@ -6210,7 +4862,7 @@
           <p:cNvPr id="6" name="TextBox 5">
             <a:extLst>
               <a:ext uri="{FF2B5EF4-FFF2-40B4-BE49-F238E27FC236}">
-                <a16:creationId xmlns:a16="http://schemas.microsoft.com/office/drawing/2014/main" id="{E40A62A9-5D62-9ACB-D230-62CA8D268227}"/>
+                <a16:creationId xmlns:a16="http://schemas.microsoft.com/office/drawing/2014/main" id="{0B783832-66B9-28D8-52E1-A4D67719CDF0}"/>
               </a:ext>
             </a:extLst>
           </p:cNvPr>
@@ -6219,8 +4871,8 @@
         </p:nvSpPr>
         <p:spPr>
           <a:xfrm>
-            <a:off x="7836535" y="662608"/>
-            <a:ext cx="4355465" cy="4893647"/>
+            <a:off x="7805057" y="468086"/>
+            <a:ext cx="4386941" cy="4770537"/>
           </a:xfrm>
           <a:prstGeom prst="rect">
             <a:avLst/>
@@ -6233,127 +4885,50 @@
           </a:bodyPr>
           <a:lstStyle/>
           <a:p>
-            <a:r>
-              <a:rPr lang="en-US" sz="3200" dirty="0">
+            <a:pPr marL="342900" indent="-342900">
+              <a:buFont typeface="Arial" panose="020B0604020202020204" pitchFamily="34" charset="0"/>
+              <a:buChar char="•"/>
+            </a:pPr>
+            <a:endParaRPr lang="en-US" sz="3600" b="1" dirty="0">
+              <a:solidFill>
+                <a:schemeClr val="bg1"/>
+              </a:solidFill>
+            </a:endParaRPr>
+          </a:p>
+          <a:p>
+            <a:pPr marL="342900" indent="-342900">
+              <a:buFont typeface="Arial" panose="020B0604020202020204" pitchFamily="34" charset="0"/>
+              <a:buChar char="•"/>
+            </a:pPr>
+            <a:r>
+              <a:rPr lang="en-US" sz="4000" b="1" dirty="0">
                 <a:solidFill>
                   <a:schemeClr val="bg1"/>
                 </a:solidFill>
               </a:rPr>
-              <a:t>What I Observed:</a:t>
-            </a:r>
-          </a:p>
-          <a:p>
-            <a:pPr marL="457200" indent="-457200">
-              <a:buFont typeface="Arial" panose="020B0604020202020204" pitchFamily="34" charset="0"/>
-              <a:buChar char="•"/>
-            </a:pPr>
-            <a:r>
-              <a:rPr lang="en-US" sz="2000" dirty="0">
+              <a:t>Models selected based on low fatality and severity scores</a:t>
+            </a:r>
+            <a:r>
+              <a:rPr lang="en-US" sz="3600" b="1" dirty="0">
                 <a:solidFill>
                   <a:schemeClr val="bg1"/>
                 </a:solidFill>
               </a:rPr>
-              <a:t>Some aircraft models appear more frequently in </a:t>
-            </a:r>
-          </a:p>
-          <a:p>
-            <a:pPr marL="457200" indent="-457200">
+              <a:t>.</a:t>
+            </a:r>
+          </a:p>
+          <a:p>
+            <a:pPr marL="342900" indent="-342900">
               <a:buFont typeface="Arial" panose="020B0604020202020204" pitchFamily="34" charset="0"/>
               <a:buChar char="•"/>
             </a:pPr>
             <a:r>
-              <a:rPr lang="en-US" sz="2000" dirty="0">
+              <a:rPr lang="en-US" sz="3600" b="1" dirty="0">
                 <a:solidFill>
                   <a:schemeClr val="bg1"/>
                 </a:solidFill>
               </a:rPr>
-              <a:t>Higher frequency often reflects:</a:t>
-            </a:r>
-          </a:p>
-          <a:p>
-            <a:pPr marL="914400" lvl="1" indent="-457200">
-              <a:buFont typeface="Arial" panose="020B0604020202020204" pitchFamily="34" charset="0"/>
-              <a:buChar char="•"/>
-            </a:pPr>
-            <a:r>
-              <a:rPr lang="en-US" sz="2000" dirty="0">
-                <a:solidFill>
-                  <a:schemeClr val="bg1"/>
-                </a:solidFill>
-              </a:rPr>
-              <a:t>Greater usage</a:t>
-            </a:r>
-          </a:p>
-          <a:p>
-            <a:pPr marL="914400" lvl="1" indent="-457200">
-              <a:buFont typeface="Arial" panose="020B0604020202020204" pitchFamily="34" charset="0"/>
-              <a:buChar char="•"/>
-            </a:pPr>
-            <a:r>
-              <a:rPr lang="en-US" sz="2000" dirty="0">
-                <a:solidFill>
-                  <a:schemeClr val="bg1"/>
-                </a:solidFill>
-              </a:rPr>
-              <a:t>Longer operational history</a:t>
-            </a:r>
-          </a:p>
-          <a:p>
-            <a:pPr marL="457200" indent="-457200">
-              <a:buFont typeface="Arial" panose="020B0604020202020204" pitchFamily="34" charset="0"/>
-              <a:buChar char="•"/>
-            </a:pPr>
-            <a:r>
-              <a:rPr lang="en-US" sz="2000" dirty="0">
-                <a:solidFill>
-                  <a:schemeClr val="bg1"/>
-                </a:solidFill>
-              </a:rPr>
-              <a:t>High frequency alone does not imply high risk</a:t>
-            </a:r>
-          </a:p>
-          <a:p>
-            <a:pPr marL="457200" indent="-457200">
-              <a:buFont typeface="Arial" panose="020B0604020202020204" pitchFamily="34" charset="0"/>
-              <a:buChar char="•"/>
-            </a:pPr>
-            <a:endParaRPr lang="en-US" sz="2000" dirty="0">
-              <a:solidFill>
-                <a:schemeClr val="bg1"/>
-              </a:solidFill>
-            </a:endParaRPr>
-          </a:p>
-          <a:p>
-            <a:endParaRPr lang="en-US" sz="2000" dirty="0">
-              <a:solidFill>
-                <a:schemeClr val="bg1"/>
-              </a:solidFill>
-            </a:endParaRPr>
-          </a:p>
-          <a:p>
-            <a:r>
-              <a:rPr lang="en-US" sz="2000" b="1" dirty="0">
-                <a:solidFill>
-                  <a:schemeClr val="bg1"/>
-                </a:solidFill>
-              </a:rPr>
-              <a:t>The fact that some aircrafts are used more often than other models makes it important to </a:t>
-            </a:r>
-            <a:r>
-              <a:rPr lang="en-US" sz="2000" b="1" dirty="0" err="1">
-                <a:solidFill>
-                  <a:schemeClr val="bg1"/>
-                </a:solidFill>
-              </a:rPr>
-              <a:t>analyse</a:t>
-            </a:r>
-            <a:r>
-              <a:rPr lang="en-US" sz="2000" b="1" dirty="0">
-                <a:solidFill>
-                  <a:schemeClr val="bg1"/>
-                </a:solidFill>
-              </a:rPr>
-              <a:t> severity of accidents to make informed decision on the risk.</a:t>
+              <a:t>Relative severity score, lower is better</a:t>
             </a:r>
           </a:p>
         </p:txBody>
@@ -6361,7 +4936,7 @@
     </p:spTree>
     <p:extLst>
       <p:ext uri="{BB962C8B-B14F-4D97-AF65-F5344CB8AC3E}">
-        <p14:creationId xmlns:p14="http://schemas.microsoft.com/office/powerpoint/2010/main" val="1110746125"/>
+        <p14:creationId xmlns:p14="http://schemas.microsoft.com/office/powerpoint/2010/main" val="3917071994"/>
       </p:ext>
     </p:extLst>
   </p:cSld>
@@ -6390,273 +4965,142 @@
       </p:grpSpPr>
       <p:sp>
         <p:nvSpPr>
-          <p:cNvPr id="2" name="Title 1">
-            <a:extLst>
-              <a:ext uri="{FF2B5EF4-FFF2-40B4-BE49-F238E27FC236}">
-                <a16:creationId xmlns:a16="http://schemas.microsoft.com/office/drawing/2014/main" id="{AD68A511-9064-4621-12A8-566C9D5CC6F3}"/>
-              </a:ext>
-            </a:extLst>
-          </p:cNvPr>
-          <p:cNvSpPr>
-            <a:spLocks noGrp="1"/>
-          </p:cNvSpPr>
-          <p:nvPr>
-            <p:ph type="title"/>
-          </p:nvPr>
+          <p:cNvPr id="4" name="Rectangle 3">
+            <a:extLst>
+              <a:ext uri="{FF2B5EF4-FFF2-40B4-BE49-F238E27FC236}">
+                <a16:creationId xmlns:a16="http://schemas.microsoft.com/office/drawing/2014/main" id="{0607C261-0AD1-DE9B-2ED1-5D88A2FFD3D4}"/>
+              </a:ext>
+            </a:extLst>
+          </p:cNvPr>
+          <p:cNvSpPr/>
+          <p:nvPr/>
         </p:nvSpPr>
         <p:spPr>
           <a:xfrm>
-            <a:off x="130629" y="1"/>
-            <a:ext cx="12061371" cy="762000"/>
+            <a:off x="0" y="0"/>
+            <a:ext cx="12192000" cy="6858000"/>
           </a:xfrm>
+          <a:prstGeom prst="rect">
+            <a:avLst/>
+          </a:prstGeom>
         </p:spPr>
+        <p:style>
+          <a:lnRef idx="2">
+            <a:schemeClr val="accent1">
+              <a:shade val="15000"/>
+            </a:schemeClr>
+          </a:lnRef>
+          <a:fillRef idx="1">
+            <a:schemeClr val="accent1"/>
+          </a:fillRef>
+          <a:effectRef idx="0">
+            <a:schemeClr val="accent1"/>
+          </a:effectRef>
+          <a:fontRef idx="minor">
+            <a:schemeClr val="lt1"/>
+          </a:fontRef>
+        </p:style>
+        <p:txBody>
+          <a:bodyPr rtlCol="0" anchor="ctr"/>
+          <a:lstStyle/>
+          <a:p>
+            <a:pPr algn="ctr"/>
+            <a:endParaRPr lang="en-US"/>
+          </a:p>
+        </p:txBody>
+      </p:sp>
+      <p:sp>
+        <p:nvSpPr>
+          <p:cNvPr id="2" name="Title 1">
+            <a:extLst>
+              <a:ext uri="{FF2B5EF4-FFF2-40B4-BE49-F238E27FC236}">
+                <a16:creationId xmlns:a16="http://schemas.microsoft.com/office/drawing/2014/main" id="{2BDFF916-5787-8278-F624-F09C9AC8C360}"/>
+              </a:ext>
+            </a:extLst>
+          </p:cNvPr>
+          <p:cNvSpPr>
+            <a:spLocks noGrp="1"/>
+          </p:cNvSpPr>
+          <p:nvPr>
+            <p:ph type="title"/>
+          </p:nvPr>
+        </p:nvSpPr>
+        <p:spPr/>
+        <p:txBody>
+          <a:bodyPr/>
+          <a:lstStyle/>
+          <a:p>
+            <a:pPr algn="ctr"/>
+            <a:r>
+              <a:rPr lang="en-US" dirty="0">
+                <a:solidFill>
+                  <a:schemeClr val="bg1"/>
+                </a:solidFill>
+                <a:latin typeface="Copperplate Gothic Bold" panose="020E0705020206020404" pitchFamily="34" charset="0"/>
+              </a:rPr>
+              <a:t>Business Value</a:t>
+            </a:r>
+          </a:p>
+        </p:txBody>
+      </p:sp>
+      <p:sp>
+        <p:nvSpPr>
+          <p:cNvPr id="3" name="Content Placeholder 2">
+            <a:extLst>
+              <a:ext uri="{FF2B5EF4-FFF2-40B4-BE49-F238E27FC236}">
+                <a16:creationId xmlns:a16="http://schemas.microsoft.com/office/drawing/2014/main" id="{3B7DB80A-613D-AE50-79EF-6236868BACCF}"/>
+              </a:ext>
+            </a:extLst>
+          </p:cNvPr>
+          <p:cNvSpPr>
+            <a:spLocks noGrp="1"/>
+          </p:cNvSpPr>
+          <p:nvPr>
+            <p:ph idx="1"/>
+          </p:nvPr>
+        </p:nvSpPr>
+        <p:spPr/>
         <p:txBody>
           <a:bodyPr>
-            <a:normAutofit fontScale="90000"/>
+            <a:normAutofit/>
           </a:bodyPr>
           <a:lstStyle/>
           <a:p>
-            <a:pPr algn="ctr"/>
-            <a:r>
-              <a:rPr lang="en-US" b="1" dirty="0">
+            <a:r>
+              <a:rPr lang="en-US" sz="4000" dirty="0">
                 <a:solidFill>
                   <a:schemeClr val="bg1"/>
                 </a:solidFill>
               </a:rPr>
-              <a:t>Injury Severity Matters More than Frequency of Accidents</a:t>
-            </a:r>
-          </a:p>
-        </p:txBody>
-      </p:sp>
-      <p:pic>
-        <p:nvPicPr>
-          <p:cNvPr id="5" name="Content Placeholder 4">
-            <a:extLst>
-              <a:ext uri="{FF2B5EF4-FFF2-40B4-BE49-F238E27FC236}">
-                <a16:creationId xmlns:a16="http://schemas.microsoft.com/office/drawing/2014/main" id="{64E43892-AE6B-8E7C-5F06-3C2000ACD5D2}"/>
-              </a:ext>
-            </a:extLst>
-          </p:cNvPr>
-          <p:cNvPicPr>
-            <a:picLocks noGrp="1" noChangeAspect="1"/>
-          </p:cNvPicPr>
-          <p:nvPr>
-            <p:ph idx="1"/>
-          </p:nvPr>
-        </p:nvPicPr>
-        <p:blipFill>
-          <a:blip r:embed="rId2">
-            <a:extLst>
-              <a:ext uri="{28A0092B-C50C-407E-A947-70E740481C1C}">
-                <a14:useLocalDpi xmlns:a14="http://schemas.microsoft.com/office/drawing/2010/main" val="0"/>
-              </a:ext>
-            </a:extLst>
-          </a:blip>
-          <a:stretch>
-            <a:fillRect/>
-          </a:stretch>
-        </p:blipFill>
-        <p:spPr>
-          <a:xfrm>
-            <a:off x="0" y="587830"/>
-            <a:ext cx="7836535" cy="6270169"/>
-          </a:xfrm>
-        </p:spPr>
-      </p:pic>
-      <p:sp>
-        <p:nvSpPr>
-          <p:cNvPr id="7" name="TextBox 6">
-            <a:extLst>
-              <a:ext uri="{FF2B5EF4-FFF2-40B4-BE49-F238E27FC236}">
-                <a16:creationId xmlns:a16="http://schemas.microsoft.com/office/drawing/2014/main" id="{9E188519-F2BC-ACBF-7136-6D247D9C7440}"/>
-              </a:ext>
-            </a:extLst>
-          </p:cNvPr>
-          <p:cNvSpPr txBox="1"/>
-          <p:nvPr/>
-        </p:nvSpPr>
-        <p:spPr>
-          <a:xfrm>
-            <a:off x="7836535" y="587830"/>
-            <a:ext cx="4355465" cy="5693866"/>
-          </a:xfrm>
-          <a:prstGeom prst="rect">
-            <a:avLst/>
-          </a:prstGeom>
-          <a:noFill/>
-        </p:spPr>
-        <p:txBody>
-          <a:bodyPr wrap="square" rtlCol="0">
-            <a:spAutoFit/>
-          </a:bodyPr>
-          <a:lstStyle/>
-          <a:p>
-            <a:r>
-              <a:rPr lang="en-US" sz="3200" dirty="0">
+              <a:t>Reduced operational risk</a:t>
+            </a:r>
+          </a:p>
+          <a:p>
+            <a:r>
+              <a:rPr lang="en-US" sz="4000" dirty="0">
                 <a:solidFill>
                   <a:schemeClr val="bg1"/>
                 </a:solidFill>
               </a:rPr>
-              <a:t>Why Severity was prioritized</a:t>
-            </a:r>
-          </a:p>
-          <a:p>
-            <a:pPr marL="457200" indent="-457200">
-              <a:buFont typeface="Arial" panose="020B0604020202020204" pitchFamily="34" charset="0"/>
-              <a:buChar char="•"/>
-            </a:pPr>
-            <a:r>
-              <a:rPr lang="en-US" sz="2000" dirty="0">
+              <a:t>Improved insurer confidence</a:t>
+            </a:r>
+          </a:p>
+          <a:p>
+            <a:r>
+              <a:rPr lang="en-US" sz="4000" dirty="0">
                 <a:solidFill>
                   <a:schemeClr val="bg1"/>
                 </a:solidFill>
               </a:rPr>
-              <a:t>Not all accident result in serious harm</a:t>
-            </a:r>
-          </a:p>
-          <a:p>
-            <a:pPr marL="457200" indent="-457200">
-              <a:buFont typeface="Arial" panose="020B0604020202020204" pitchFamily="34" charset="0"/>
-              <a:buChar char="•"/>
-            </a:pPr>
-            <a:r>
-              <a:rPr lang="en-US" sz="2000" dirty="0">
-                <a:solidFill>
-                  <a:schemeClr val="bg1"/>
-                </a:solidFill>
-              </a:rPr>
-              <a:t>I evaluated:</a:t>
-            </a:r>
-          </a:p>
-          <a:p>
-            <a:pPr marL="914400" lvl="1" indent="-457200">
-              <a:buFont typeface="Arial" panose="020B0604020202020204" pitchFamily="34" charset="0"/>
-              <a:buChar char="•"/>
-            </a:pPr>
-            <a:r>
-              <a:rPr lang="en-US" sz="2000" dirty="0">
-                <a:solidFill>
-                  <a:schemeClr val="bg1"/>
-                </a:solidFill>
-              </a:rPr>
-              <a:t>Fatal injuries</a:t>
-            </a:r>
-          </a:p>
-          <a:p>
-            <a:pPr marL="914400" lvl="1" indent="-457200">
-              <a:buFont typeface="Arial" panose="020B0604020202020204" pitchFamily="34" charset="0"/>
-              <a:buChar char="•"/>
-            </a:pPr>
-            <a:r>
-              <a:rPr lang="en-US" sz="2000" dirty="0">
-                <a:solidFill>
-                  <a:schemeClr val="bg1"/>
-                </a:solidFill>
-              </a:rPr>
-              <a:t>Serious injuries</a:t>
-            </a:r>
-          </a:p>
-          <a:p>
-            <a:pPr marL="914400" lvl="1" indent="-457200">
-              <a:buFont typeface="Arial" panose="020B0604020202020204" pitchFamily="34" charset="0"/>
-              <a:buChar char="•"/>
-            </a:pPr>
-            <a:r>
-              <a:rPr lang="en-US" sz="2000" dirty="0">
-                <a:solidFill>
-                  <a:schemeClr val="bg1"/>
-                </a:solidFill>
-              </a:rPr>
-              <a:t>Minor injuries</a:t>
-            </a:r>
-          </a:p>
-          <a:p>
-            <a:pPr marL="457200" indent="-457200">
-              <a:buFont typeface="Arial" panose="020B0604020202020204" pitchFamily="34" charset="0"/>
-              <a:buChar char="•"/>
-            </a:pPr>
-            <a:r>
-              <a:rPr lang="en-US" sz="2000" dirty="0">
-                <a:solidFill>
-                  <a:schemeClr val="bg1"/>
-                </a:solidFill>
-              </a:rPr>
-              <a:t>Developed a severity score to compare impact</a:t>
-            </a:r>
-          </a:p>
-          <a:p>
-            <a:pPr marL="457200" indent="-457200">
-              <a:buFont typeface="Arial" panose="020B0604020202020204" pitchFamily="34" charset="0"/>
-              <a:buChar char="•"/>
-            </a:pPr>
-            <a:endParaRPr lang="en-US" sz="2000" dirty="0">
-              <a:solidFill>
-                <a:schemeClr val="bg1"/>
-              </a:solidFill>
-            </a:endParaRPr>
-          </a:p>
-          <a:p>
-            <a:pPr marL="457200" indent="-457200">
-              <a:buFont typeface="Arial" panose="020B0604020202020204" pitchFamily="34" charset="0"/>
-              <a:buChar char="•"/>
-            </a:pPr>
-            <a:endParaRPr lang="en-US" sz="2000" dirty="0">
-              <a:solidFill>
-                <a:schemeClr val="bg1"/>
-              </a:solidFill>
-            </a:endParaRPr>
-          </a:p>
-          <a:p>
-            <a:pPr marL="457200" indent="-457200">
-              <a:buFont typeface="Arial" panose="020B0604020202020204" pitchFamily="34" charset="0"/>
-              <a:buChar char="•"/>
-            </a:pPr>
-            <a:endParaRPr lang="en-US" sz="2000" dirty="0">
-              <a:solidFill>
-                <a:schemeClr val="bg1"/>
-              </a:solidFill>
-            </a:endParaRPr>
-          </a:p>
-          <a:p>
-            <a:pPr marL="457200" indent="-457200">
-              <a:buFont typeface="Arial" panose="020B0604020202020204" pitchFamily="34" charset="0"/>
-              <a:buChar char="•"/>
-            </a:pPr>
-            <a:endParaRPr lang="en-US" sz="2000" dirty="0">
-              <a:solidFill>
-                <a:schemeClr val="bg1"/>
-              </a:solidFill>
-            </a:endParaRPr>
-          </a:p>
-          <a:p>
-            <a:r>
-              <a:rPr lang="en-US" sz="2000" dirty="0">
-                <a:solidFill>
-                  <a:schemeClr val="bg1"/>
-                </a:solidFill>
-              </a:rPr>
-              <a:t>Low risk aircrafts are those with lower injury outcomes when the accidents </a:t>
-            </a:r>
-            <a:r>
-              <a:rPr lang="en-US" sz="2000" dirty="0" err="1">
-                <a:solidFill>
-                  <a:schemeClr val="bg1"/>
-                </a:solidFill>
-              </a:rPr>
-              <a:t>occured</a:t>
-            </a:r>
-            <a:endParaRPr lang="en-US" sz="2000" dirty="0">
-              <a:solidFill>
-                <a:schemeClr val="bg1"/>
-              </a:solidFill>
-            </a:endParaRPr>
+              <a:t>Predictable long term costs</a:t>
+            </a:r>
           </a:p>
         </p:txBody>
       </p:sp>
     </p:spTree>
     <p:extLst>
       <p:ext uri="{BB962C8B-B14F-4D97-AF65-F5344CB8AC3E}">
-        <p14:creationId xmlns:p14="http://schemas.microsoft.com/office/powerpoint/2010/main" val="1477361159"/>
+        <p14:creationId xmlns:p14="http://schemas.microsoft.com/office/powerpoint/2010/main" val="133423108"/>
       </p:ext>
     </p:extLst>
   </p:cSld>
@@ -6688,7 +5132,7 @@
           <p:cNvPr id="2" name="Title 1">
             <a:extLst>
               <a:ext uri="{FF2B5EF4-FFF2-40B4-BE49-F238E27FC236}">
-                <a16:creationId xmlns:a16="http://schemas.microsoft.com/office/drawing/2014/main" id="{16945EED-6FF9-32A6-13DA-19F35A09EE0E}"/>
+                <a16:creationId xmlns:a16="http://schemas.microsoft.com/office/drawing/2014/main" id="{9FAF2FAE-C1C4-1AEC-6A55-122CAEFCC976}"/>
               </a:ext>
             </a:extLst>
           </p:cNvPr>
@@ -6699,15 +5143,10 @@
             <p:ph type="title"/>
           </p:nvPr>
         </p:nvSpPr>
-        <p:spPr>
-          <a:xfrm>
-            <a:off x="0" y="0"/>
-            <a:ext cx="12115800" cy="566057"/>
-          </a:xfrm>
-        </p:spPr>
+        <p:spPr/>
         <p:txBody>
           <a:bodyPr>
-            <a:normAutofit fontScale="90000"/>
+            <a:normAutofit/>
           </a:bodyPr>
           <a:lstStyle/>
           <a:p>
@@ -6717,213 +5156,80 @@
                 <a:solidFill>
                   <a:schemeClr val="bg1"/>
                 </a:solidFill>
+                <a:latin typeface="Copperplate Gothic Bold" panose="020E0705020206020404" pitchFamily="34" charset="0"/>
               </a:rPr>
-              <a:t>Low Risk Aircrafts Models</a:t>
-            </a:r>
-          </a:p>
-        </p:txBody>
-      </p:sp>
-      <p:pic>
-        <p:nvPicPr>
-          <p:cNvPr id="5" name="Content Placeholder 4">
-            <a:extLst>
-              <a:ext uri="{FF2B5EF4-FFF2-40B4-BE49-F238E27FC236}">
-                <a16:creationId xmlns:a16="http://schemas.microsoft.com/office/drawing/2014/main" id="{138E8C60-CAA4-E62E-6738-77E2075DC132}"/>
-              </a:ext>
-            </a:extLst>
-          </p:cNvPr>
-          <p:cNvPicPr>
-            <a:picLocks noGrp="1" noChangeAspect="1"/>
-          </p:cNvPicPr>
+              <a:t>Stakeholder’s Recommendations</a:t>
+            </a:r>
+          </a:p>
+        </p:txBody>
+      </p:sp>
+      <p:sp>
+        <p:nvSpPr>
+          <p:cNvPr id="3" name="Content Placeholder 2">
+            <a:extLst>
+              <a:ext uri="{FF2B5EF4-FFF2-40B4-BE49-F238E27FC236}">
+                <a16:creationId xmlns:a16="http://schemas.microsoft.com/office/drawing/2014/main" id="{9297BF5D-BE62-CDF3-82B9-BE96139E3ED5}"/>
+              </a:ext>
+            </a:extLst>
+          </p:cNvPr>
+          <p:cNvSpPr>
+            <a:spLocks noGrp="1"/>
+          </p:cNvSpPr>
           <p:nvPr>
             <p:ph idx="1"/>
           </p:nvPr>
-        </p:nvPicPr>
-        <p:blipFill>
-          <a:blip r:embed="rId2">
-            <a:extLst>
-              <a:ext uri="{28A0092B-C50C-407E-A947-70E740481C1C}">
-                <a14:useLocalDpi xmlns:a14="http://schemas.microsoft.com/office/drawing/2010/main" val="0"/>
-              </a:ext>
-            </a:extLst>
-          </a:blip>
-          <a:stretch>
-            <a:fillRect/>
-          </a:stretch>
-        </p:blipFill>
-        <p:spPr>
-          <a:xfrm>
-            <a:off x="1" y="468086"/>
-            <a:ext cx="7805056" cy="6389913"/>
-          </a:xfrm>
-        </p:spPr>
-      </p:pic>
-      <p:sp>
-        <p:nvSpPr>
-          <p:cNvPr id="6" name="TextBox 5">
-            <a:extLst>
-              <a:ext uri="{FF2B5EF4-FFF2-40B4-BE49-F238E27FC236}">
-                <a16:creationId xmlns:a16="http://schemas.microsoft.com/office/drawing/2014/main" id="{0B783832-66B9-28D8-52E1-A4D67719CDF0}"/>
-              </a:ext>
-            </a:extLst>
-          </p:cNvPr>
-          <p:cNvSpPr txBox="1"/>
-          <p:nvPr/>
-        </p:nvSpPr>
-        <p:spPr>
-          <a:xfrm>
-            <a:off x="7805057" y="468086"/>
-            <a:ext cx="4386941" cy="5386090"/>
-          </a:xfrm>
-          <a:prstGeom prst="rect">
-            <a:avLst/>
-          </a:prstGeom>
-          <a:noFill/>
-        </p:spPr>
-        <p:txBody>
-          <a:bodyPr wrap="square" rtlCol="0">
-            <a:spAutoFit/>
+        </p:nvSpPr>
+        <p:spPr/>
+        <p:txBody>
+          <a:bodyPr>
+            <a:normAutofit/>
           </a:bodyPr>
           <a:lstStyle/>
           <a:p>
             <a:r>
-              <a:rPr lang="en-US" sz="3200" b="1" dirty="0">
+              <a:rPr lang="en-US" sz="4000" dirty="0">
                 <a:solidFill>
                   <a:schemeClr val="bg1"/>
                 </a:solidFill>
               </a:rPr>
-              <a:t>Low Risk Aircraft Models Identified</a:t>
-            </a:r>
-          </a:p>
-          <a:p>
-            <a:pPr marL="342900" indent="-342900">
-              <a:buFont typeface="Arial" panose="020B0604020202020204" pitchFamily="34" charset="0"/>
-              <a:buChar char="•"/>
+              <a:t>Prioritize low severity aircraft models </a:t>
+            </a:r>
+          </a:p>
+          <a:p>
+            <a:pPr marL="0" indent="0">
+              <a:buNone/>
             </a:pPr>
-            <a:r>
-              <a:rPr lang="en-US" sz="2000" b="1" dirty="0">
+            <a:endParaRPr lang="en-US" sz="4000" dirty="0">
+              <a:solidFill>
+                <a:schemeClr val="bg1"/>
+              </a:solidFill>
+            </a:endParaRPr>
+          </a:p>
+          <a:p>
+            <a:r>
+              <a:rPr lang="en-US" sz="4000" dirty="0">
                 <a:solidFill>
                   <a:schemeClr val="bg1"/>
                 </a:solidFill>
               </a:rPr>
-              <a:t>Selected models show:</a:t>
-            </a:r>
-          </a:p>
-          <a:p>
-            <a:pPr marL="800100" lvl="1" indent="-342900">
-              <a:buFont typeface="Arial" panose="020B0604020202020204" pitchFamily="34" charset="0"/>
-              <a:buChar char="•"/>
-            </a:pPr>
-            <a:r>
-              <a:rPr lang="en-US" sz="2000" b="1" dirty="0">
+              <a:t>Avoid reputation only decisions</a:t>
+            </a:r>
+          </a:p>
+          <a:p>
+            <a:endParaRPr lang="en-US" sz="4000" dirty="0">
+              <a:solidFill>
+                <a:schemeClr val="bg1"/>
+              </a:solidFill>
+            </a:endParaRPr>
+          </a:p>
+          <a:p>
+            <a:r>
+              <a:rPr lang="en-US" sz="4000" dirty="0">
                 <a:solidFill>
                   <a:schemeClr val="bg1"/>
                 </a:solidFill>
               </a:rPr>
-              <a:t>Multiple recorded accidents</a:t>
-            </a:r>
-          </a:p>
-          <a:p>
-            <a:pPr marL="800100" lvl="1" indent="-342900">
-              <a:buFont typeface="Arial" panose="020B0604020202020204" pitchFamily="34" charset="0"/>
-              <a:buChar char="•"/>
-            </a:pPr>
-            <a:r>
-              <a:rPr lang="en-US" sz="2000" b="1" dirty="0">
-                <a:solidFill>
-                  <a:schemeClr val="bg1"/>
-                </a:solidFill>
-              </a:rPr>
-              <a:t>Zero to Near zero fatalities</a:t>
-            </a:r>
-          </a:p>
-          <a:p>
-            <a:pPr marL="800100" lvl="1" indent="-342900">
-              <a:buFont typeface="Arial" panose="020B0604020202020204" pitchFamily="34" charset="0"/>
-              <a:buChar char="•"/>
-            </a:pPr>
-            <a:r>
-              <a:rPr lang="en-US" sz="2000" b="1" dirty="0">
-                <a:solidFill>
-                  <a:schemeClr val="bg1"/>
-                </a:solidFill>
-              </a:rPr>
-              <a:t>Consistently low severity scores</a:t>
-            </a:r>
-          </a:p>
-          <a:p>
-            <a:pPr marL="342900" indent="-342900">
-              <a:buFont typeface="Arial" panose="020B0604020202020204" pitchFamily="34" charset="0"/>
-              <a:buChar char="•"/>
-            </a:pPr>
-            <a:r>
-              <a:rPr lang="en-US" sz="2000" b="1" dirty="0">
-                <a:solidFill>
-                  <a:schemeClr val="bg1"/>
-                </a:solidFill>
-              </a:rPr>
-              <a:t>These models demonstrate strong safety performance</a:t>
-            </a:r>
-          </a:p>
-          <a:p>
-            <a:pPr marL="342900" indent="-342900">
-              <a:buFont typeface="Arial" panose="020B0604020202020204" pitchFamily="34" charset="0"/>
-              <a:buChar char="•"/>
-            </a:pPr>
-            <a:endParaRPr lang="en-US" sz="2000" b="1" dirty="0">
-              <a:solidFill>
-                <a:schemeClr val="bg1"/>
-              </a:solidFill>
-            </a:endParaRPr>
-          </a:p>
-          <a:p>
-            <a:endParaRPr lang="en-US" sz="2000" b="1" dirty="0">
-              <a:solidFill>
-                <a:schemeClr val="bg1"/>
-              </a:solidFill>
-            </a:endParaRPr>
-          </a:p>
-          <a:p>
-            <a:pPr marL="342900" indent="-342900">
-              <a:buFont typeface="Arial" panose="020B0604020202020204" pitchFamily="34" charset="0"/>
-              <a:buChar char="•"/>
-            </a:pPr>
-            <a:endParaRPr lang="en-US" sz="2000" b="1" dirty="0">
-              <a:solidFill>
-                <a:schemeClr val="bg1"/>
-              </a:solidFill>
-            </a:endParaRPr>
-          </a:p>
-          <a:p>
-            <a:pPr marL="342900" indent="-342900">
-              <a:buFont typeface="Arial" panose="020B0604020202020204" pitchFamily="34" charset="0"/>
-              <a:buChar char="•"/>
-            </a:pPr>
-            <a:endParaRPr lang="en-US" sz="2000" b="1" dirty="0">
-              <a:solidFill>
-                <a:schemeClr val="bg1"/>
-              </a:solidFill>
-            </a:endParaRPr>
-          </a:p>
-          <a:p>
-            <a:pPr marL="342900" indent="-342900">
-              <a:buFont typeface="Arial" panose="020B0604020202020204" pitchFamily="34" charset="0"/>
-              <a:buChar char="•"/>
-            </a:pPr>
-            <a:endParaRPr lang="en-US" sz="2000" b="1" dirty="0">
-              <a:solidFill>
-                <a:schemeClr val="bg1"/>
-              </a:solidFill>
-            </a:endParaRPr>
-          </a:p>
-          <a:p>
-            <a:r>
-              <a:rPr lang="en-US" sz="2000" b="1" dirty="0">
-                <a:solidFill>
-                  <a:schemeClr val="bg1"/>
-                </a:solidFill>
-              </a:rPr>
-              <a:t>The displayed models show safer investment options based on historical evidence.</a:t>
+              <a:t>Embed safety metrics into procurement</a:t>
             </a:r>
           </a:p>
         </p:txBody>
@@ -6931,7 +5237,7 @@
     </p:spTree>
     <p:extLst>
       <p:ext uri="{BB962C8B-B14F-4D97-AF65-F5344CB8AC3E}">
-        <p14:creationId xmlns:p14="http://schemas.microsoft.com/office/powerpoint/2010/main" val="3917071994"/>
+        <p14:creationId xmlns:p14="http://schemas.microsoft.com/office/powerpoint/2010/main" val="656139331"/>
       </p:ext>
     </p:extLst>
   </p:cSld>

</xml_diff>